<commit_message>
Upload SKF Loesungen (6)
</commit_message>
<xml_diff>
--- a/Abbildungen/wtfi_6_wahrscheinlichkeitstheorie_modell.pptx
+++ b/Abbildungen/wtfi_6_wahrscheinlichkeitstheorie_modell.pptx
@@ -2,12 +2,12 @@
 <file path=ppt/presentation.xml><?xml version="1.0" encoding="utf-8"?>
 <p:presentation xmlns:a="http://schemas.openxmlformats.org/drawingml/2006/main" xmlns:r="http://schemas.openxmlformats.org/officeDocument/2006/relationships" xmlns:p="http://schemas.openxmlformats.org/presentationml/2006/main" saveSubsetFonts="1">
   <p:sldMasterIdLst>
-    <p:sldMasterId id="2147483672" r:id="rId1"/>
+    <p:sldMasterId id="2147483696" r:id="rId1"/>
   </p:sldMasterIdLst>
   <p:sldIdLst>
     <p:sldId id="258" r:id="rId2"/>
   </p:sldIdLst>
-  <p:sldSz cx="9144000" cy="5759450"/>
+  <p:sldSz cx="8280400" cy="5759450"/>
   <p:notesSz cx="6889750" cy="10021888"/>
   <p:defaultTextStyle>
     <a:defPPr>
@@ -114,7 +114,7 @@
 
 <file path=ppt/slideLayouts/slideLayout1.xml><?xml version="1.0" encoding="utf-8"?>
 <p:sldLayout xmlns:a="http://schemas.openxmlformats.org/drawingml/2006/main" xmlns:r="http://schemas.openxmlformats.org/officeDocument/2006/relationships" xmlns:p="http://schemas.openxmlformats.org/presentationml/2006/main" type="title" preserve="1">
-  <p:cSld name="Title Slide">
+  <p:cSld name="Titelfolie">
     <p:spTree>
       <p:nvGrpSpPr>
         <p:cNvPr id="1" name=""/>
@@ -141,21 +141,21 @@
         </p:nvSpPr>
         <p:spPr>
           <a:xfrm>
-            <a:off x="1143000" y="942577"/>
-            <a:ext cx="6858000" cy="2005142"/>
+            <a:off x="621030" y="942577"/>
+            <a:ext cx="7038340" cy="2005142"/>
           </a:xfrm>
         </p:spPr>
         <p:txBody>
           <a:bodyPr anchor="b"/>
           <a:lstStyle>
             <a:lvl1pPr algn="ctr">
-              <a:defRPr sz="4500"/>
+              <a:defRPr sz="5039"/>
             </a:lvl1pPr>
           </a:lstStyle>
           <a:p>
             <a:r>
-              <a:rPr lang="en-US"/>
-              <a:t>Click to edit Master title style</a:t>
+              <a:rPr lang="de-DE"/>
+              <a:t>Mastertitelformat bearbeiten</a:t>
             </a:r>
             <a:endParaRPr lang="en-US" dirty="0"/>
           </a:p>
@@ -173,8 +173,8 @@
         </p:nvSpPr>
         <p:spPr>
           <a:xfrm>
-            <a:off x="1143000" y="3025045"/>
-            <a:ext cx="6858000" cy="1390533"/>
+            <a:off x="1035050" y="3025045"/>
+            <a:ext cx="6210300" cy="1390533"/>
           </a:xfrm>
         </p:spPr>
         <p:txBody>
@@ -182,45 +182,45 @@
           <a:lstStyle>
             <a:lvl1pPr marL="0" indent="0" algn="ctr">
               <a:buNone/>
-              <a:defRPr sz="1800"/>
+              <a:defRPr sz="2016"/>
             </a:lvl1pPr>
-            <a:lvl2pPr marL="342900" indent="0" algn="ctr">
-              <a:buNone/>
-              <a:defRPr sz="1500"/>
+            <a:lvl2pPr marL="383957" indent="0" algn="ctr">
+              <a:buNone/>
+              <a:defRPr sz="1680"/>
             </a:lvl2pPr>
-            <a:lvl3pPr marL="685800" indent="0" algn="ctr">
-              <a:buNone/>
-              <a:defRPr sz="1350"/>
+            <a:lvl3pPr marL="767913" indent="0" algn="ctr">
+              <a:buNone/>
+              <a:defRPr sz="1512"/>
             </a:lvl3pPr>
-            <a:lvl4pPr marL="1028700" indent="0" algn="ctr">
-              <a:buNone/>
-              <a:defRPr sz="1200"/>
+            <a:lvl4pPr marL="1151870" indent="0" algn="ctr">
+              <a:buNone/>
+              <a:defRPr sz="1344"/>
             </a:lvl4pPr>
-            <a:lvl5pPr marL="1371600" indent="0" algn="ctr">
-              <a:buNone/>
-              <a:defRPr sz="1200"/>
+            <a:lvl5pPr marL="1535826" indent="0" algn="ctr">
+              <a:buNone/>
+              <a:defRPr sz="1344"/>
             </a:lvl5pPr>
-            <a:lvl6pPr marL="1714500" indent="0" algn="ctr">
-              <a:buNone/>
-              <a:defRPr sz="1200"/>
+            <a:lvl6pPr marL="1919783" indent="0" algn="ctr">
+              <a:buNone/>
+              <a:defRPr sz="1344"/>
             </a:lvl6pPr>
-            <a:lvl7pPr marL="2057400" indent="0" algn="ctr">
-              <a:buNone/>
-              <a:defRPr sz="1200"/>
+            <a:lvl7pPr marL="2303739" indent="0" algn="ctr">
+              <a:buNone/>
+              <a:defRPr sz="1344"/>
             </a:lvl7pPr>
-            <a:lvl8pPr marL="2400300" indent="0" algn="ctr">
-              <a:buNone/>
-              <a:defRPr sz="1200"/>
+            <a:lvl8pPr marL="2687696" indent="0" algn="ctr">
+              <a:buNone/>
+              <a:defRPr sz="1344"/>
             </a:lvl8pPr>
-            <a:lvl9pPr marL="2743200" indent="0" algn="ctr">
-              <a:buNone/>
-              <a:defRPr sz="1200"/>
+            <a:lvl9pPr marL="3071652" indent="0" algn="ctr">
+              <a:buNone/>
+              <a:defRPr sz="1344"/>
             </a:lvl9pPr>
           </a:lstStyle>
           <a:p>
             <a:r>
-              <a:rPr lang="en-US"/>
-              <a:t>Click to edit Master subtitle style</a:t>
+              <a:rPr lang="de-DE"/>
+              <a:t>Master-Untertitelformat bearbeiten</a:t>
             </a:r>
             <a:endParaRPr lang="en-US" dirty="0"/>
           </a:p>
@@ -243,7 +243,7 @@
           <a:p>
             <a:fld id="{2B41A6A7-50F4-463B-910E-CFAB06BEAEBD}" type="datetimeFigureOut">
               <a:rPr lang="de-DE" smtClean="0"/>
-              <a:t>20.10.2021</a:t>
+              <a:t>13.11.2022</a:t>
             </a:fld>
             <a:endParaRPr lang="de-DE"/>
           </a:p>
@@ -285,7 +285,7 @@
           <a:p>
             <a:fld id="{21F71EA9-8F64-41D2-B146-948977218CCE}" type="slidenum">
               <a:rPr lang="de-DE" smtClean="0"/>
-              <a:t>‹#›</a:t>
+              <a:t>‹Nr.›</a:t>
             </a:fld>
             <a:endParaRPr lang="de-DE"/>
           </a:p>
@@ -294,7 +294,7 @@
     </p:spTree>
     <p:extLst>
       <p:ext uri="{BB962C8B-B14F-4D97-AF65-F5344CB8AC3E}">
-        <p14:creationId xmlns:p14="http://schemas.microsoft.com/office/powerpoint/2010/main" val="1650432340"/>
+        <p14:creationId xmlns:p14="http://schemas.microsoft.com/office/powerpoint/2010/main" val="2075598266"/>
       </p:ext>
     </p:extLst>
   </p:cSld>
@@ -306,7 +306,7 @@
 
 <file path=ppt/slideLayouts/slideLayout10.xml><?xml version="1.0" encoding="utf-8"?>
 <p:sldLayout xmlns:a="http://schemas.openxmlformats.org/drawingml/2006/main" xmlns:r="http://schemas.openxmlformats.org/officeDocument/2006/relationships" xmlns:p="http://schemas.openxmlformats.org/presentationml/2006/main" type="vertTx" preserve="1">
-  <p:cSld name="Title and Vertical Text">
+  <p:cSld name="Titel und vertikaler Text">
     <p:spTree>
       <p:nvGrpSpPr>
         <p:cNvPr id="1" name=""/>
@@ -337,8 +337,8 @@
           <a:lstStyle/>
           <a:p>
             <a:r>
-              <a:rPr lang="en-US"/>
-              <a:t>Click to edit Master title style</a:t>
+              <a:rPr lang="de-DE"/>
+              <a:t>Mastertitelformat bearbeiten</a:t>
             </a:r>
             <a:endParaRPr lang="en-US" dirty="0"/>
           </a:p>
@@ -361,36 +361,36 @@
           <a:p>
             <a:pPr lvl="0"/>
             <a:r>
-              <a:rPr lang="en-US"/>
-              <a:t>Click to edit Master text styles</a:t>
+              <a:rPr lang="de-DE"/>
+              <a:t>Mastertextformat bearbeiten</a:t>
             </a:r>
           </a:p>
           <a:p>
             <a:pPr lvl="1"/>
             <a:r>
-              <a:rPr lang="en-US"/>
-              <a:t>Second level</a:t>
+              <a:rPr lang="de-DE"/>
+              <a:t>Zweite Ebene</a:t>
             </a:r>
           </a:p>
           <a:p>
             <a:pPr lvl="2"/>
             <a:r>
-              <a:rPr lang="en-US"/>
-              <a:t>Third level</a:t>
+              <a:rPr lang="de-DE"/>
+              <a:t>Dritte Ebene</a:t>
             </a:r>
           </a:p>
           <a:p>
             <a:pPr lvl="3"/>
             <a:r>
-              <a:rPr lang="en-US"/>
-              <a:t>Fourth level</a:t>
+              <a:rPr lang="de-DE"/>
+              <a:t>Vierte Ebene</a:t>
             </a:r>
           </a:p>
           <a:p>
             <a:pPr lvl="4"/>
             <a:r>
-              <a:rPr lang="en-US"/>
-              <a:t>Fifth level</a:t>
+              <a:rPr lang="de-DE"/>
+              <a:t>Fünfte Ebene</a:t>
             </a:r>
             <a:endParaRPr lang="en-US" dirty="0"/>
           </a:p>
@@ -413,7 +413,7 @@
           <a:p>
             <a:fld id="{2B41A6A7-50F4-463B-910E-CFAB06BEAEBD}" type="datetimeFigureOut">
               <a:rPr lang="de-DE" smtClean="0"/>
-              <a:t>20.10.2021</a:t>
+              <a:t>13.11.2022</a:t>
             </a:fld>
             <a:endParaRPr lang="de-DE"/>
           </a:p>
@@ -455,7 +455,7 @@
           <a:p>
             <a:fld id="{21F71EA9-8F64-41D2-B146-948977218CCE}" type="slidenum">
               <a:rPr lang="de-DE" smtClean="0"/>
-              <a:t>‹#›</a:t>
+              <a:t>‹Nr.›</a:t>
             </a:fld>
             <a:endParaRPr lang="de-DE"/>
           </a:p>
@@ -464,7 +464,7 @@
     </p:spTree>
     <p:extLst>
       <p:ext uri="{BB962C8B-B14F-4D97-AF65-F5344CB8AC3E}">
-        <p14:creationId xmlns:p14="http://schemas.microsoft.com/office/powerpoint/2010/main" val="3897623916"/>
+        <p14:creationId xmlns:p14="http://schemas.microsoft.com/office/powerpoint/2010/main" val="1760634480"/>
       </p:ext>
     </p:extLst>
   </p:cSld>
@@ -476,7 +476,7 @@
 
 <file path=ppt/slideLayouts/slideLayout11.xml><?xml version="1.0" encoding="utf-8"?>
 <p:sldLayout xmlns:a="http://schemas.openxmlformats.org/drawingml/2006/main" xmlns:r="http://schemas.openxmlformats.org/officeDocument/2006/relationships" xmlns:p="http://schemas.openxmlformats.org/presentationml/2006/main" type="vertTitleAndTx" preserve="1">
-  <p:cSld name="Vertical Title and Text">
+  <p:cSld name="Vertikaler Titel und Text">
     <p:spTree>
       <p:nvGrpSpPr>
         <p:cNvPr id="1" name=""/>
@@ -503,8 +503,8 @@
         </p:nvSpPr>
         <p:spPr>
           <a:xfrm>
-            <a:off x="6543675" y="306637"/>
-            <a:ext cx="1971675" cy="4880868"/>
+            <a:off x="5925662" y="306637"/>
+            <a:ext cx="1785461" cy="4880868"/>
           </a:xfrm>
         </p:spPr>
         <p:txBody>
@@ -512,8 +512,8 @@
           <a:lstStyle/>
           <a:p>
             <a:r>
-              <a:rPr lang="en-US"/>
-              <a:t>Click to edit Master title style</a:t>
+              <a:rPr lang="de-DE"/>
+              <a:t>Mastertitelformat bearbeiten</a:t>
             </a:r>
             <a:endParaRPr lang="en-US" dirty="0"/>
           </a:p>
@@ -531,8 +531,8 @@
         </p:nvSpPr>
         <p:spPr>
           <a:xfrm>
-            <a:off x="628650" y="306637"/>
-            <a:ext cx="5800725" cy="4880868"/>
+            <a:off x="569278" y="306637"/>
+            <a:ext cx="5252879" cy="4880868"/>
           </a:xfrm>
         </p:spPr>
         <p:txBody>
@@ -541,36 +541,36 @@
           <a:p>
             <a:pPr lvl="0"/>
             <a:r>
-              <a:rPr lang="en-US"/>
-              <a:t>Click to edit Master text styles</a:t>
+              <a:rPr lang="de-DE"/>
+              <a:t>Mastertextformat bearbeiten</a:t>
             </a:r>
           </a:p>
           <a:p>
             <a:pPr lvl="1"/>
             <a:r>
-              <a:rPr lang="en-US"/>
-              <a:t>Second level</a:t>
+              <a:rPr lang="de-DE"/>
+              <a:t>Zweite Ebene</a:t>
             </a:r>
           </a:p>
           <a:p>
             <a:pPr lvl="2"/>
             <a:r>
-              <a:rPr lang="en-US"/>
-              <a:t>Third level</a:t>
+              <a:rPr lang="de-DE"/>
+              <a:t>Dritte Ebene</a:t>
             </a:r>
           </a:p>
           <a:p>
             <a:pPr lvl="3"/>
             <a:r>
-              <a:rPr lang="en-US"/>
-              <a:t>Fourth level</a:t>
+              <a:rPr lang="de-DE"/>
+              <a:t>Vierte Ebene</a:t>
             </a:r>
           </a:p>
           <a:p>
             <a:pPr lvl="4"/>
             <a:r>
-              <a:rPr lang="en-US"/>
-              <a:t>Fifth level</a:t>
+              <a:rPr lang="de-DE"/>
+              <a:t>Fünfte Ebene</a:t>
             </a:r>
             <a:endParaRPr lang="en-US" dirty="0"/>
           </a:p>
@@ -593,7 +593,7 @@
           <a:p>
             <a:fld id="{2B41A6A7-50F4-463B-910E-CFAB06BEAEBD}" type="datetimeFigureOut">
               <a:rPr lang="de-DE" smtClean="0"/>
-              <a:t>20.10.2021</a:t>
+              <a:t>13.11.2022</a:t>
             </a:fld>
             <a:endParaRPr lang="de-DE"/>
           </a:p>
@@ -635,7 +635,7 @@
           <a:p>
             <a:fld id="{21F71EA9-8F64-41D2-B146-948977218CCE}" type="slidenum">
               <a:rPr lang="de-DE" smtClean="0"/>
-              <a:t>‹#›</a:t>
+              <a:t>‹Nr.›</a:t>
             </a:fld>
             <a:endParaRPr lang="de-DE"/>
           </a:p>
@@ -644,7 +644,7 @@
     </p:spTree>
     <p:extLst>
       <p:ext uri="{BB962C8B-B14F-4D97-AF65-F5344CB8AC3E}">
-        <p14:creationId xmlns:p14="http://schemas.microsoft.com/office/powerpoint/2010/main" val="2746731717"/>
+        <p14:creationId xmlns:p14="http://schemas.microsoft.com/office/powerpoint/2010/main" val="3882846984"/>
       </p:ext>
     </p:extLst>
   </p:cSld>
@@ -656,7 +656,7 @@
 
 <file path=ppt/slideLayouts/slideLayout2.xml><?xml version="1.0" encoding="utf-8"?>
 <p:sldLayout xmlns:a="http://schemas.openxmlformats.org/drawingml/2006/main" xmlns:r="http://schemas.openxmlformats.org/officeDocument/2006/relationships" xmlns:p="http://schemas.openxmlformats.org/presentationml/2006/main" type="obj" preserve="1">
-  <p:cSld name="Title and Content">
+  <p:cSld name="Titel und Inhalt">
     <p:spTree>
       <p:nvGrpSpPr>
         <p:cNvPr id="1" name=""/>
@@ -687,8 +687,8 @@
           <a:lstStyle/>
           <a:p>
             <a:r>
-              <a:rPr lang="en-US"/>
-              <a:t>Click to edit Master title style</a:t>
+              <a:rPr lang="de-DE"/>
+              <a:t>Mastertitelformat bearbeiten</a:t>
             </a:r>
             <a:endParaRPr lang="en-US" dirty="0"/>
           </a:p>
@@ -711,36 +711,36 @@
           <a:p>
             <a:pPr lvl="0"/>
             <a:r>
-              <a:rPr lang="en-US"/>
-              <a:t>Click to edit Master text styles</a:t>
+              <a:rPr lang="de-DE"/>
+              <a:t>Mastertextformat bearbeiten</a:t>
             </a:r>
           </a:p>
           <a:p>
             <a:pPr lvl="1"/>
             <a:r>
-              <a:rPr lang="en-US"/>
-              <a:t>Second level</a:t>
+              <a:rPr lang="de-DE"/>
+              <a:t>Zweite Ebene</a:t>
             </a:r>
           </a:p>
           <a:p>
             <a:pPr lvl="2"/>
             <a:r>
-              <a:rPr lang="en-US"/>
-              <a:t>Third level</a:t>
+              <a:rPr lang="de-DE"/>
+              <a:t>Dritte Ebene</a:t>
             </a:r>
           </a:p>
           <a:p>
             <a:pPr lvl="3"/>
             <a:r>
-              <a:rPr lang="en-US"/>
-              <a:t>Fourth level</a:t>
+              <a:rPr lang="de-DE"/>
+              <a:t>Vierte Ebene</a:t>
             </a:r>
           </a:p>
           <a:p>
             <a:pPr lvl="4"/>
             <a:r>
-              <a:rPr lang="en-US"/>
-              <a:t>Fifth level</a:t>
+              <a:rPr lang="de-DE"/>
+              <a:t>Fünfte Ebene</a:t>
             </a:r>
             <a:endParaRPr lang="en-US" dirty="0"/>
           </a:p>
@@ -763,7 +763,7 @@
           <a:p>
             <a:fld id="{2B41A6A7-50F4-463B-910E-CFAB06BEAEBD}" type="datetimeFigureOut">
               <a:rPr lang="de-DE" smtClean="0"/>
-              <a:t>20.10.2021</a:t>
+              <a:t>13.11.2022</a:t>
             </a:fld>
             <a:endParaRPr lang="de-DE"/>
           </a:p>
@@ -805,7 +805,7 @@
           <a:p>
             <a:fld id="{21F71EA9-8F64-41D2-B146-948977218CCE}" type="slidenum">
               <a:rPr lang="de-DE" smtClean="0"/>
-              <a:t>‹#›</a:t>
+              <a:t>‹Nr.›</a:t>
             </a:fld>
             <a:endParaRPr lang="de-DE"/>
           </a:p>
@@ -814,7 +814,7 @@
     </p:spTree>
     <p:extLst>
       <p:ext uri="{BB962C8B-B14F-4D97-AF65-F5344CB8AC3E}">
-        <p14:creationId xmlns:p14="http://schemas.microsoft.com/office/powerpoint/2010/main" val="27599638"/>
+        <p14:creationId xmlns:p14="http://schemas.microsoft.com/office/powerpoint/2010/main" val="3346661561"/>
       </p:ext>
     </p:extLst>
   </p:cSld>
@@ -826,7 +826,7 @@
 
 <file path=ppt/slideLayouts/slideLayout3.xml><?xml version="1.0" encoding="utf-8"?>
 <p:sldLayout xmlns:a="http://schemas.openxmlformats.org/drawingml/2006/main" xmlns:r="http://schemas.openxmlformats.org/officeDocument/2006/relationships" xmlns:p="http://schemas.openxmlformats.org/presentationml/2006/main" type="secHead" preserve="1">
-  <p:cSld name="Section Header">
+  <p:cSld name="Abschnitts-&#10;überschrift">
     <p:spTree>
       <p:nvGrpSpPr>
         <p:cNvPr id="1" name=""/>
@@ -853,21 +853,21 @@
         </p:nvSpPr>
         <p:spPr>
           <a:xfrm>
-            <a:off x="623888" y="1435864"/>
-            <a:ext cx="7886700" cy="2395771"/>
+            <a:off x="564965" y="1435864"/>
+            <a:ext cx="7141845" cy="2395771"/>
           </a:xfrm>
         </p:spPr>
         <p:txBody>
           <a:bodyPr anchor="b"/>
           <a:lstStyle>
             <a:lvl1pPr>
-              <a:defRPr sz="4500"/>
+              <a:defRPr sz="5039"/>
             </a:lvl1pPr>
           </a:lstStyle>
           <a:p>
             <a:r>
-              <a:rPr lang="en-US"/>
-              <a:t>Click to edit Master title style</a:t>
+              <a:rPr lang="de-DE"/>
+              <a:t>Mastertitelformat bearbeiten</a:t>
             </a:r>
             <a:endParaRPr lang="en-US" dirty="0"/>
           </a:p>
@@ -885,8 +885,8 @@
         </p:nvSpPr>
         <p:spPr>
           <a:xfrm>
-            <a:off x="623888" y="3854300"/>
-            <a:ext cx="7886700" cy="1259879"/>
+            <a:off x="564965" y="3854300"/>
+            <a:ext cx="7141845" cy="1259879"/>
           </a:xfrm>
         </p:spPr>
         <p:txBody>
@@ -894,17 +894,15 @@
           <a:lstStyle>
             <a:lvl1pPr marL="0" indent="0">
               <a:buNone/>
-              <a:defRPr sz="1800">
+              <a:defRPr sz="2016">
                 <a:solidFill>
-                  <a:schemeClr val="tx1">
-                    <a:tint val="75000"/>
-                  </a:schemeClr>
+                  <a:schemeClr val="tx1"/>
                 </a:solidFill>
               </a:defRPr>
             </a:lvl1pPr>
-            <a:lvl2pPr marL="342900" indent="0">
-              <a:buNone/>
-              <a:defRPr sz="1500">
+            <a:lvl2pPr marL="383957" indent="0">
+              <a:buNone/>
+              <a:defRPr sz="1680">
                 <a:solidFill>
                   <a:schemeClr val="tx1">
                     <a:tint val="75000"/>
@@ -912,9 +910,9 @@
                 </a:solidFill>
               </a:defRPr>
             </a:lvl2pPr>
-            <a:lvl3pPr marL="685800" indent="0">
-              <a:buNone/>
-              <a:defRPr sz="1350">
+            <a:lvl3pPr marL="767913" indent="0">
+              <a:buNone/>
+              <a:defRPr sz="1512">
                 <a:solidFill>
                   <a:schemeClr val="tx1">
                     <a:tint val="75000"/>
@@ -922,9 +920,9 @@
                 </a:solidFill>
               </a:defRPr>
             </a:lvl3pPr>
-            <a:lvl4pPr marL="1028700" indent="0">
-              <a:buNone/>
-              <a:defRPr sz="1200">
+            <a:lvl4pPr marL="1151870" indent="0">
+              <a:buNone/>
+              <a:defRPr sz="1344">
                 <a:solidFill>
                   <a:schemeClr val="tx1">
                     <a:tint val="75000"/>
@@ -932,9 +930,9 @@
                 </a:solidFill>
               </a:defRPr>
             </a:lvl4pPr>
-            <a:lvl5pPr marL="1371600" indent="0">
-              <a:buNone/>
-              <a:defRPr sz="1200">
+            <a:lvl5pPr marL="1535826" indent="0">
+              <a:buNone/>
+              <a:defRPr sz="1344">
                 <a:solidFill>
                   <a:schemeClr val="tx1">
                     <a:tint val="75000"/>
@@ -942,9 +940,9 @@
                 </a:solidFill>
               </a:defRPr>
             </a:lvl5pPr>
-            <a:lvl6pPr marL="1714500" indent="0">
-              <a:buNone/>
-              <a:defRPr sz="1200">
+            <a:lvl6pPr marL="1919783" indent="0">
+              <a:buNone/>
+              <a:defRPr sz="1344">
                 <a:solidFill>
                   <a:schemeClr val="tx1">
                     <a:tint val="75000"/>
@@ -952,9 +950,9 @@
                 </a:solidFill>
               </a:defRPr>
             </a:lvl6pPr>
-            <a:lvl7pPr marL="2057400" indent="0">
-              <a:buNone/>
-              <a:defRPr sz="1200">
+            <a:lvl7pPr marL="2303739" indent="0">
+              <a:buNone/>
+              <a:defRPr sz="1344">
                 <a:solidFill>
                   <a:schemeClr val="tx1">
                     <a:tint val="75000"/>
@@ -962,9 +960,9 @@
                 </a:solidFill>
               </a:defRPr>
             </a:lvl7pPr>
-            <a:lvl8pPr marL="2400300" indent="0">
-              <a:buNone/>
-              <a:defRPr sz="1200">
+            <a:lvl8pPr marL="2687696" indent="0">
+              <a:buNone/>
+              <a:defRPr sz="1344">
                 <a:solidFill>
                   <a:schemeClr val="tx1">
                     <a:tint val="75000"/>
@@ -972,9 +970,9 @@
                 </a:solidFill>
               </a:defRPr>
             </a:lvl8pPr>
-            <a:lvl9pPr marL="2743200" indent="0">
-              <a:buNone/>
-              <a:defRPr sz="1200">
+            <a:lvl9pPr marL="3071652" indent="0">
+              <a:buNone/>
+              <a:defRPr sz="1344">
                 <a:solidFill>
                   <a:schemeClr val="tx1">
                     <a:tint val="75000"/>
@@ -986,8 +984,8 @@
           <a:p>
             <a:pPr lvl="0"/>
             <a:r>
-              <a:rPr lang="en-US"/>
-              <a:t>Click to edit Master text styles</a:t>
+              <a:rPr lang="de-DE"/>
+              <a:t>Mastertextformat bearbeiten</a:t>
             </a:r>
           </a:p>
         </p:txBody>
@@ -1009,7 +1007,7 @@
           <a:p>
             <a:fld id="{2B41A6A7-50F4-463B-910E-CFAB06BEAEBD}" type="datetimeFigureOut">
               <a:rPr lang="de-DE" smtClean="0"/>
-              <a:t>20.10.2021</a:t>
+              <a:t>13.11.2022</a:t>
             </a:fld>
             <a:endParaRPr lang="de-DE"/>
           </a:p>
@@ -1051,7 +1049,7 @@
           <a:p>
             <a:fld id="{21F71EA9-8F64-41D2-B146-948977218CCE}" type="slidenum">
               <a:rPr lang="de-DE" smtClean="0"/>
-              <a:t>‹#›</a:t>
+              <a:t>‹Nr.›</a:t>
             </a:fld>
             <a:endParaRPr lang="de-DE"/>
           </a:p>
@@ -1060,7 +1058,7 @@
     </p:spTree>
     <p:extLst>
       <p:ext uri="{BB962C8B-B14F-4D97-AF65-F5344CB8AC3E}">
-        <p14:creationId xmlns:p14="http://schemas.microsoft.com/office/powerpoint/2010/main" val="1736753238"/>
+        <p14:creationId xmlns:p14="http://schemas.microsoft.com/office/powerpoint/2010/main" val="1797997854"/>
       </p:ext>
     </p:extLst>
   </p:cSld>
@@ -1072,7 +1070,7 @@
 
 <file path=ppt/slideLayouts/slideLayout4.xml><?xml version="1.0" encoding="utf-8"?>
 <p:sldLayout xmlns:a="http://schemas.openxmlformats.org/drawingml/2006/main" xmlns:r="http://schemas.openxmlformats.org/officeDocument/2006/relationships" xmlns:p="http://schemas.openxmlformats.org/presentationml/2006/main" type="twoObj" preserve="1">
-  <p:cSld name="Two Content">
+  <p:cSld name="Zwei Inhalte">
     <p:spTree>
       <p:nvGrpSpPr>
         <p:cNvPr id="1" name=""/>
@@ -1103,8 +1101,8 @@
           <a:lstStyle/>
           <a:p>
             <a:r>
-              <a:rPr lang="en-US"/>
-              <a:t>Click to edit Master title style</a:t>
+              <a:rPr lang="de-DE"/>
+              <a:t>Mastertitelformat bearbeiten</a:t>
             </a:r>
             <a:endParaRPr lang="en-US" dirty="0"/>
           </a:p>
@@ -1122,8 +1120,8 @@
         </p:nvSpPr>
         <p:spPr>
           <a:xfrm>
-            <a:off x="628650" y="1533187"/>
-            <a:ext cx="3886200" cy="3654318"/>
+            <a:off x="569278" y="1533187"/>
+            <a:ext cx="3519170" cy="3654318"/>
           </a:xfrm>
         </p:spPr>
         <p:txBody>
@@ -1132,36 +1130,36 @@
           <a:p>
             <a:pPr lvl="0"/>
             <a:r>
-              <a:rPr lang="en-US"/>
-              <a:t>Click to edit Master text styles</a:t>
+              <a:rPr lang="de-DE"/>
+              <a:t>Mastertextformat bearbeiten</a:t>
             </a:r>
           </a:p>
           <a:p>
             <a:pPr lvl="1"/>
             <a:r>
-              <a:rPr lang="en-US"/>
-              <a:t>Second level</a:t>
+              <a:rPr lang="de-DE"/>
+              <a:t>Zweite Ebene</a:t>
             </a:r>
           </a:p>
           <a:p>
             <a:pPr lvl="2"/>
             <a:r>
-              <a:rPr lang="en-US"/>
-              <a:t>Third level</a:t>
+              <a:rPr lang="de-DE"/>
+              <a:t>Dritte Ebene</a:t>
             </a:r>
           </a:p>
           <a:p>
             <a:pPr lvl="3"/>
             <a:r>
-              <a:rPr lang="en-US"/>
-              <a:t>Fourth level</a:t>
+              <a:rPr lang="de-DE"/>
+              <a:t>Vierte Ebene</a:t>
             </a:r>
           </a:p>
           <a:p>
             <a:pPr lvl="4"/>
             <a:r>
-              <a:rPr lang="en-US"/>
-              <a:t>Fifth level</a:t>
+              <a:rPr lang="de-DE"/>
+              <a:t>Fünfte Ebene</a:t>
             </a:r>
             <a:endParaRPr lang="en-US" dirty="0"/>
           </a:p>
@@ -1179,8 +1177,8 @@
         </p:nvSpPr>
         <p:spPr>
           <a:xfrm>
-            <a:off x="4629150" y="1533187"/>
-            <a:ext cx="3886200" cy="3654318"/>
+            <a:off x="4191953" y="1533187"/>
+            <a:ext cx="3519170" cy="3654318"/>
           </a:xfrm>
         </p:spPr>
         <p:txBody>
@@ -1189,36 +1187,36 @@
           <a:p>
             <a:pPr lvl="0"/>
             <a:r>
-              <a:rPr lang="en-US"/>
-              <a:t>Click to edit Master text styles</a:t>
+              <a:rPr lang="de-DE"/>
+              <a:t>Mastertextformat bearbeiten</a:t>
             </a:r>
           </a:p>
           <a:p>
             <a:pPr lvl="1"/>
             <a:r>
-              <a:rPr lang="en-US"/>
-              <a:t>Second level</a:t>
+              <a:rPr lang="de-DE"/>
+              <a:t>Zweite Ebene</a:t>
             </a:r>
           </a:p>
           <a:p>
             <a:pPr lvl="2"/>
             <a:r>
-              <a:rPr lang="en-US"/>
-              <a:t>Third level</a:t>
+              <a:rPr lang="de-DE"/>
+              <a:t>Dritte Ebene</a:t>
             </a:r>
           </a:p>
           <a:p>
             <a:pPr lvl="3"/>
             <a:r>
-              <a:rPr lang="en-US"/>
-              <a:t>Fourth level</a:t>
+              <a:rPr lang="de-DE"/>
+              <a:t>Vierte Ebene</a:t>
             </a:r>
           </a:p>
           <a:p>
             <a:pPr lvl="4"/>
             <a:r>
-              <a:rPr lang="en-US"/>
-              <a:t>Fifth level</a:t>
+              <a:rPr lang="de-DE"/>
+              <a:t>Fünfte Ebene</a:t>
             </a:r>
             <a:endParaRPr lang="en-US" dirty="0"/>
           </a:p>
@@ -1241,7 +1239,7 @@
           <a:p>
             <a:fld id="{2B41A6A7-50F4-463B-910E-CFAB06BEAEBD}" type="datetimeFigureOut">
               <a:rPr lang="de-DE" smtClean="0"/>
-              <a:t>20.10.2021</a:t>
+              <a:t>13.11.2022</a:t>
             </a:fld>
             <a:endParaRPr lang="de-DE"/>
           </a:p>
@@ -1283,7 +1281,7 @@
           <a:p>
             <a:fld id="{21F71EA9-8F64-41D2-B146-948977218CCE}" type="slidenum">
               <a:rPr lang="de-DE" smtClean="0"/>
-              <a:t>‹#›</a:t>
+              <a:t>‹Nr.›</a:t>
             </a:fld>
             <a:endParaRPr lang="de-DE"/>
           </a:p>
@@ -1292,7 +1290,7 @@
     </p:spTree>
     <p:extLst>
       <p:ext uri="{BB962C8B-B14F-4D97-AF65-F5344CB8AC3E}">
-        <p14:creationId xmlns:p14="http://schemas.microsoft.com/office/powerpoint/2010/main" val="1650878966"/>
+        <p14:creationId xmlns:p14="http://schemas.microsoft.com/office/powerpoint/2010/main" val="1894841333"/>
       </p:ext>
     </p:extLst>
   </p:cSld>
@@ -1304,7 +1302,7 @@
 
 <file path=ppt/slideLayouts/slideLayout5.xml><?xml version="1.0" encoding="utf-8"?>
 <p:sldLayout xmlns:a="http://schemas.openxmlformats.org/drawingml/2006/main" xmlns:r="http://schemas.openxmlformats.org/officeDocument/2006/relationships" xmlns:p="http://schemas.openxmlformats.org/presentationml/2006/main" type="twoTxTwoObj" preserve="1">
-  <p:cSld name="Comparison">
+  <p:cSld name="Vergleich">
     <p:spTree>
       <p:nvGrpSpPr>
         <p:cNvPr id="1" name=""/>
@@ -1331,8 +1329,8 @@
         </p:nvSpPr>
         <p:spPr>
           <a:xfrm>
-            <a:off x="629841" y="306638"/>
-            <a:ext cx="7886700" cy="1113227"/>
+            <a:off x="570356" y="306639"/>
+            <a:ext cx="7141845" cy="1113227"/>
           </a:xfrm>
         </p:spPr>
         <p:txBody>
@@ -1340,8 +1338,8 @@
           <a:lstStyle/>
           <a:p>
             <a:r>
-              <a:rPr lang="en-US"/>
-              <a:t>Click to edit Master title style</a:t>
+              <a:rPr lang="de-DE"/>
+              <a:t>Mastertitelformat bearbeiten</a:t>
             </a:r>
             <a:endParaRPr lang="en-US" dirty="0"/>
           </a:p>
@@ -1359,8 +1357,8 @@
         </p:nvSpPr>
         <p:spPr>
           <a:xfrm>
-            <a:off x="629842" y="1411865"/>
-            <a:ext cx="3868340" cy="691934"/>
+            <a:off x="570357" y="1411865"/>
+            <a:ext cx="3502997" cy="691934"/>
           </a:xfrm>
         </p:spPr>
         <p:txBody>
@@ -1368,46 +1366,46 @@
           <a:lstStyle>
             <a:lvl1pPr marL="0" indent="0">
               <a:buNone/>
-              <a:defRPr sz="1800" b="1"/>
+              <a:defRPr sz="2016" b="1"/>
             </a:lvl1pPr>
-            <a:lvl2pPr marL="342900" indent="0">
-              <a:buNone/>
-              <a:defRPr sz="1500" b="1"/>
+            <a:lvl2pPr marL="383957" indent="0">
+              <a:buNone/>
+              <a:defRPr sz="1680" b="1"/>
             </a:lvl2pPr>
-            <a:lvl3pPr marL="685800" indent="0">
-              <a:buNone/>
-              <a:defRPr sz="1350" b="1"/>
+            <a:lvl3pPr marL="767913" indent="0">
+              <a:buNone/>
+              <a:defRPr sz="1512" b="1"/>
             </a:lvl3pPr>
-            <a:lvl4pPr marL="1028700" indent="0">
-              <a:buNone/>
-              <a:defRPr sz="1200" b="1"/>
+            <a:lvl4pPr marL="1151870" indent="0">
+              <a:buNone/>
+              <a:defRPr sz="1344" b="1"/>
             </a:lvl4pPr>
-            <a:lvl5pPr marL="1371600" indent="0">
-              <a:buNone/>
-              <a:defRPr sz="1200" b="1"/>
+            <a:lvl5pPr marL="1535826" indent="0">
+              <a:buNone/>
+              <a:defRPr sz="1344" b="1"/>
             </a:lvl5pPr>
-            <a:lvl6pPr marL="1714500" indent="0">
-              <a:buNone/>
-              <a:defRPr sz="1200" b="1"/>
+            <a:lvl6pPr marL="1919783" indent="0">
+              <a:buNone/>
+              <a:defRPr sz="1344" b="1"/>
             </a:lvl6pPr>
-            <a:lvl7pPr marL="2057400" indent="0">
-              <a:buNone/>
-              <a:defRPr sz="1200" b="1"/>
+            <a:lvl7pPr marL="2303739" indent="0">
+              <a:buNone/>
+              <a:defRPr sz="1344" b="1"/>
             </a:lvl7pPr>
-            <a:lvl8pPr marL="2400300" indent="0">
-              <a:buNone/>
-              <a:defRPr sz="1200" b="1"/>
+            <a:lvl8pPr marL="2687696" indent="0">
+              <a:buNone/>
+              <a:defRPr sz="1344" b="1"/>
             </a:lvl8pPr>
-            <a:lvl9pPr marL="2743200" indent="0">
-              <a:buNone/>
-              <a:defRPr sz="1200" b="1"/>
+            <a:lvl9pPr marL="3071652" indent="0">
+              <a:buNone/>
+              <a:defRPr sz="1344" b="1"/>
             </a:lvl9pPr>
           </a:lstStyle>
           <a:p>
             <a:pPr lvl="0"/>
             <a:r>
-              <a:rPr lang="en-US"/>
-              <a:t>Click to edit Master text styles</a:t>
+              <a:rPr lang="de-DE"/>
+              <a:t>Mastertextformat bearbeiten</a:t>
             </a:r>
           </a:p>
         </p:txBody>
@@ -1424,8 +1422,8 @@
         </p:nvSpPr>
         <p:spPr>
           <a:xfrm>
-            <a:off x="629842" y="2103799"/>
-            <a:ext cx="3868340" cy="3094372"/>
+            <a:off x="570357" y="2103799"/>
+            <a:ext cx="3502997" cy="3094372"/>
           </a:xfrm>
         </p:spPr>
         <p:txBody>
@@ -1434,36 +1432,36 @@
           <a:p>
             <a:pPr lvl="0"/>
             <a:r>
-              <a:rPr lang="en-US"/>
-              <a:t>Click to edit Master text styles</a:t>
+              <a:rPr lang="de-DE"/>
+              <a:t>Mastertextformat bearbeiten</a:t>
             </a:r>
           </a:p>
           <a:p>
             <a:pPr lvl="1"/>
             <a:r>
-              <a:rPr lang="en-US"/>
-              <a:t>Second level</a:t>
+              <a:rPr lang="de-DE"/>
+              <a:t>Zweite Ebene</a:t>
             </a:r>
           </a:p>
           <a:p>
             <a:pPr lvl="2"/>
             <a:r>
-              <a:rPr lang="en-US"/>
-              <a:t>Third level</a:t>
+              <a:rPr lang="de-DE"/>
+              <a:t>Dritte Ebene</a:t>
             </a:r>
           </a:p>
           <a:p>
             <a:pPr lvl="3"/>
             <a:r>
-              <a:rPr lang="en-US"/>
-              <a:t>Fourth level</a:t>
+              <a:rPr lang="de-DE"/>
+              <a:t>Vierte Ebene</a:t>
             </a:r>
           </a:p>
           <a:p>
             <a:pPr lvl="4"/>
             <a:r>
-              <a:rPr lang="en-US"/>
-              <a:t>Fifth level</a:t>
+              <a:rPr lang="de-DE"/>
+              <a:t>Fünfte Ebene</a:t>
             </a:r>
             <a:endParaRPr lang="en-US" dirty="0"/>
           </a:p>
@@ -1481,8 +1479,8 @@
         </p:nvSpPr>
         <p:spPr>
           <a:xfrm>
-            <a:off x="4629150" y="1411865"/>
-            <a:ext cx="3887391" cy="691934"/>
+            <a:off x="4191953" y="1411865"/>
+            <a:ext cx="3520249" cy="691934"/>
           </a:xfrm>
         </p:spPr>
         <p:txBody>
@@ -1490,46 +1488,46 @@
           <a:lstStyle>
             <a:lvl1pPr marL="0" indent="0">
               <a:buNone/>
-              <a:defRPr sz="1800" b="1"/>
+              <a:defRPr sz="2016" b="1"/>
             </a:lvl1pPr>
-            <a:lvl2pPr marL="342900" indent="0">
-              <a:buNone/>
-              <a:defRPr sz="1500" b="1"/>
+            <a:lvl2pPr marL="383957" indent="0">
+              <a:buNone/>
+              <a:defRPr sz="1680" b="1"/>
             </a:lvl2pPr>
-            <a:lvl3pPr marL="685800" indent="0">
-              <a:buNone/>
-              <a:defRPr sz="1350" b="1"/>
+            <a:lvl3pPr marL="767913" indent="0">
+              <a:buNone/>
+              <a:defRPr sz="1512" b="1"/>
             </a:lvl3pPr>
-            <a:lvl4pPr marL="1028700" indent="0">
-              <a:buNone/>
-              <a:defRPr sz="1200" b="1"/>
+            <a:lvl4pPr marL="1151870" indent="0">
+              <a:buNone/>
+              <a:defRPr sz="1344" b="1"/>
             </a:lvl4pPr>
-            <a:lvl5pPr marL="1371600" indent="0">
-              <a:buNone/>
-              <a:defRPr sz="1200" b="1"/>
+            <a:lvl5pPr marL="1535826" indent="0">
+              <a:buNone/>
+              <a:defRPr sz="1344" b="1"/>
             </a:lvl5pPr>
-            <a:lvl6pPr marL="1714500" indent="0">
-              <a:buNone/>
-              <a:defRPr sz="1200" b="1"/>
+            <a:lvl6pPr marL="1919783" indent="0">
+              <a:buNone/>
+              <a:defRPr sz="1344" b="1"/>
             </a:lvl6pPr>
-            <a:lvl7pPr marL="2057400" indent="0">
-              <a:buNone/>
-              <a:defRPr sz="1200" b="1"/>
+            <a:lvl7pPr marL="2303739" indent="0">
+              <a:buNone/>
+              <a:defRPr sz="1344" b="1"/>
             </a:lvl7pPr>
-            <a:lvl8pPr marL="2400300" indent="0">
-              <a:buNone/>
-              <a:defRPr sz="1200" b="1"/>
+            <a:lvl8pPr marL="2687696" indent="0">
+              <a:buNone/>
+              <a:defRPr sz="1344" b="1"/>
             </a:lvl8pPr>
-            <a:lvl9pPr marL="2743200" indent="0">
-              <a:buNone/>
-              <a:defRPr sz="1200" b="1"/>
+            <a:lvl9pPr marL="3071652" indent="0">
+              <a:buNone/>
+              <a:defRPr sz="1344" b="1"/>
             </a:lvl9pPr>
           </a:lstStyle>
           <a:p>
             <a:pPr lvl="0"/>
             <a:r>
-              <a:rPr lang="en-US"/>
-              <a:t>Click to edit Master text styles</a:t>
+              <a:rPr lang="de-DE"/>
+              <a:t>Mastertextformat bearbeiten</a:t>
             </a:r>
           </a:p>
         </p:txBody>
@@ -1546,8 +1544,8 @@
         </p:nvSpPr>
         <p:spPr>
           <a:xfrm>
-            <a:off x="4629150" y="2103799"/>
-            <a:ext cx="3887391" cy="3094372"/>
+            <a:off x="4191953" y="2103799"/>
+            <a:ext cx="3520249" cy="3094372"/>
           </a:xfrm>
         </p:spPr>
         <p:txBody>
@@ -1556,36 +1554,36 @@
           <a:p>
             <a:pPr lvl="0"/>
             <a:r>
-              <a:rPr lang="en-US"/>
-              <a:t>Click to edit Master text styles</a:t>
+              <a:rPr lang="de-DE"/>
+              <a:t>Mastertextformat bearbeiten</a:t>
             </a:r>
           </a:p>
           <a:p>
             <a:pPr lvl="1"/>
             <a:r>
-              <a:rPr lang="en-US"/>
-              <a:t>Second level</a:t>
+              <a:rPr lang="de-DE"/>
+              <a:t>Zweite Ebene</a:t>
             </a:r>
           </a:p>
           <a:p>
             <a:pPr lvl="2"/>
             <a:r>
-              <a:rPr lang="en-US"/>
-              <a:t>Third level</a:t>
+              <a:rPr lang="de-DE"/>
+              <a:t>Dritte Ebene</a:t>
             </a:r>
           </a:p>
           <a:p>
             <a:pPr lvl="3"/>
             <a:r>
-              <a:rPr lang="en-US"/>
-              <a:t>Fourth level</a:t>
+              <a:rPr lang="de-DE"/>
+              <a:t>Vierte Ebene</a:t>
             </a:r>
           </a:p>
           <a:p>
             <a:pPr lvl="4"/>
             <a:r>
-              <a:rPr lang="en-US"/>
-              <a:t>Fifth level</a:t>
+              <a:rPr lang="de-DE"/>
+              <a:t>Fünfte Ebene</a:t>
             </a:r>
             <a:endParaRPr lang="en-US" dirty="0"/>
           </a:p>
@@ -1608,7 +1606,7 @@
           <a:p>
             <a:fld id="{2B41A6A7-50F4-463B-910E-CFAB06BEAEBD}" type="datetimeFigureOut">
               <a:rPr lang="de-DE" smtClean="0"/>
-              <a:t>20.10.2021</a:t>
+              <a:t>13.11.2022</a:t>
             </a:fld>
             <a:endParaRPr lang="de-DE"/>
           </a:p>
@@ -1650,7 +1648,7 @@
           <a:p>
             <a:fld id="{21F71EA9-8F64-41D2-B146-948977218CCE}" type="slidenum">
               <a:rPr lang="de-DE" smtClean="0"/>
-              <a:t>‹#›</a:t>
+              <a:t>‹Nr.›</a:t>
             </a:fld>
             <a:endParaRPr lang="de-DE"/>
           </a:p>
@@ -1659,7 +1657,7 @@
     </p:spTree>
     <p:extLst>
       <p:ext uri="{BB962C8B-B14F-4D97-AF65-F5344CB8AC3E}">
-        <p14:creationId xmlns:p14="http://schemas.microsoft.com/office/powerpoint/2010/main" val="3826636410"/>
+        <p14:creationId xmlns:p14="http://schemas.microsoft.com/office/powerpoint/2010/main" val="1573217178"/>
       </p:ext>
     </p:extLst>
   </p:cSld>
@@ -1671,7 +1669,7 @@
 
 <file path=ppt/slideLayouts/slideLayout6.xml><?xml version="1.0" encoding="utf-8"?>
 <p:sldLayout xmlns:a="http://schemas.openxmlformats.org/drawingml/2006/main" xmlns:r="http://schemas.openxmlformats.org/officeDocument/2006/relationships" xmlns:p="http://schemas.openxmlformats.org/presentationml/2006/main" type="titleOnly" preserve="1">
-  <p:cSld name="Title Only">
+  <p:cSld name="Nur Titel">
     <p:spTree>
       <p:nvGrpSpPr>
         <p:cNvPr id="1" name=""/>
@@ -1702,8 +1700,8 @@
           <a:lstStyle/>
           <a:p>
             <a:r>
-              <a:rPr lang="en-US"/>
-              <a:t>Click to edit Master title style</a:t>
+              <a:rPr lang="de-DE"/>
+              <a:t>Mastertitelformat bearbeiten</a:t>
             </a:r>
             <a:endParaRPr lang="en-US" dirty="0"/>
           </a:p>
@@ -1726,7 +1724,7 @@
           <a:p>
             <a:fld id="{2B41A6A7-50F4-463B-910E-CFAB06BEAEBD}" type="datetimeFigureOut">
               <a:rPr lang="de-DE" smtClean="0"/>
-              <a:t>20.10.2021</a:t>
+              <a:t>13.11.2022</a:t>
             </a:fld>
             <a:endParaRPr lang="de-DE"/>
           </a:p>
@@ -1768,7 +1766,7 @@
           <a:p>
             <a:fld id="{21F71EA9-8F64-41D2-B146-948977218CCE}" type="slidenum">
               <a:rPr lang="de-DE" smtClean="0"/>
-              <a:t>‹#›</a:t>
+              <a:t>‹Nr.›</a:t>
             </a:fld>
             <a:endParaRPr lang="de-DE"/>
           </a:p>
@@ -1777,7 +1775,7 @@
     </p:spTree>
     <p:extLst>
       <p:ext uri="{BB962C8B-B14F-4D97-AF65-F5344CB8AC3E}">
-        <p14:creationId xmlns:p14="http://schemas.microsoft.com/office/powerpoint/2010/main" val="796643651"/>
+        <p14:creationId xmlns:p14="http://schemas.microsoft.com/office/powerpoint/2010/main" val="1168418082"/>
       </p:ext>
     </p:extLst>
   </p:cSld>
@@ -1789,7 +1787,7 @@
 
 <file path=ppt/slideLayouts/slideLayout7.xml><?xml version="1.0" encoding="utf-8"?>
 <p:sldLayout xmlns:a="http://schemas.openxmlformats.org/drawingml/2006/main" xmlns:r="http://schemas.openxmlformats.org/officeDocument/2006/relationships" xmlns:p="http://schemas.openxmlformats.org/presentationml/2006/main" type="blank" preserve="1">
-  <p:cSld name="Blank">
+  <p:cSld name="Leer">
     <p:spTree>
       <p:nvGrpSpPr>
         <p:cNvPr id="1" name=""/>
@@ -1821,7 +1819,7 @@
           <a:p>
             <a:fld id="{2B41A6A7-50F4-463B-910E-CFAB06BEAEBD}" type="datetimeFigureOut">
               <a:rPr lang="de-DE" smtClean="0"/>
-              <a:t>20.10.2021</a:t>
+              <a:t>13.11.2022</a:t>
             </a:fld>
             <a:endParaRPr lang="de-DE"/>
           </a:p>
@@ -1863,7 +1861,7 @@
           <a:p>
             <a:fld id="{21F71EA9-8F64-41D2-B146-948977218CCE}" type="slidenum">
               <a:rPr lang="de-DE" smtClean="0"/>
-              <a:t>‹#›</a:t>
+              <a:t>‹Nr.›</a:t>
             </a:fld>
             <a:endParaRPr lang="de-DE"/>
           </a:p>
@@ -1872,7 +1870,7 @@
     </p:spTree>
     <p:extLst>
       <p:ext uri="{BB962C8B-B14F-4D97-AF65-F5344CB8AC3E}">
-        <p14:creationId xmlns:p14="http://schemas.microsoft.com/office/powerpoint/2010/main" val="2370942175"/>
+        <p14:creationId xmlns:p14="http://schemas.microsoft.com/office/powerpoint/2010/main" val="3986503724"/>
       </p:ext>
     </p:extLst>
   </p:cSld>
@@ -1884,7 +1882,7 @@
 
 <file path=ppt/slideLayouts/slideLayout8.xml><?xml version="1.0" encoding="utf-8"?>
 <p:sldLayout xmlns:a="http://schemas.openxmlformats.org/drawingml/2006/main" xmlns:r="http://schemas.openxmlformats.org/officeDocument/2006/relationships" xmlns:p="http://schemas.openxmlformats.org/presentationml/2006/main" type="objTx" preserve="1">
-  <p:cSld name="Content with Caption">
+  <p:cSld name="Inhalt mit Überschrift">
     <p:spTree>
       <p:nvGrpSpPr>
         <p:cNvPr id="1" name=""/>
@@ -1911,21 +1909,21 @@
         </p:nvSpPr>
         <p:spPr>
           <a:xfrm>
-            <a:off x="629841" y="383963"/>
-            <a:ext cx="2949178" cy="1343872"/>
+            <a:off x="570356" y="383963"/>
+            <a:ext cx="2670645" cy="1343872"/>
           </a:xfrm>
         </p:spPr>
         <p:txBody>
           <a:bodyPr anchor="b"/>
           <a:lstStyle>
             <a:lvl1pPr>
-              <a:defRPr sz="2400"/>
+              <a:defRPr sz="2687"/>
             </a:lvl1pPr>
           </a:lstStyle>
           <a:p>
             <a:r>
-              <a:rPr lang="en-US"/>
-              <a:t>Click to edit Master title style</a:t>
+              <a:rPr lang="de-DE"/>
+              <a:t>Mastertitelformat bearbeiten</a:t>
             </a:r>
             <a:endParaRPr lang="en-US" dirty="0"/>
           </a:p>
@@ -1943,74 +1941,74 @@
         </p:nvSpPr>
         <p:spPr>
           <a:xfrm>
-            <a:off x="3887391" y="829255"/>
-            <a:ext cx="4629150" cy="4092942"/>
+            <a:off x="3520248" y="829256"/>
+            <a:ext cx="4191953" cy="4092942"/>
           </a:xfrm>
         </p:spPr>
         <p:txBody>
           <a:bodyPr/>
           <a:lstStyle>
             <a:lvl1pPr>
-              <a:defRPr sz="2400"/>
+              <a:defRPr sz="2687"/>
             </a:lvl1pPr>
             <a:lvl2pPr>
-              <a:defRPr sz="2100"/>
+              <a:defRPr sz="2351"/>
             </a:lvl2pPr>
             <a:lvl3pPr>
-              <a:defRPr sz="1800"/>
+              <a:defRPr sz="2016"/>
             </a:lvl3pPr>
             <a:lvl4pPr>
-              <a:defRPr sz="1500"/>
+              <a:defRPr sz="1680"/>
             </a:lvl4pPr>
             <a:lvl5pPr>
-              <a:defRPr sz="1500"/>
+              <a:defRPr sz="1680"/>
             </a:lvl5pPr>
             <a:lvl6pPr>
-              <a:defRPr sz="1500"/>
+              <a:defRPr sz="1680"/>
             </a:lvl6pPr>
             <a:lvl7pPr>
-              <a:defRPr sz="1500"/>
+              <a:defRPr sz="1680"/>
             </a:lvl7pPr>
             <a:lvl8pPr>
-              <a:defRPr sz="1500"/>
+              <a:defRPr sz="1680"/>
             </a:lvl8pPr>
             <a:lvl9pPr>
-              <a:defRPr sz="1500"/>
+              <a:defRPr sz="1680"/>
             </a:lvl9pPr>
           </a:lstStyle>
           <a:p>
             <a:pPr lvl="0"/>
             <a:r>
-              <a:rPr lang="en-US"/>
-              <a:t>Click to edit Master text styles</a:t>
+              <a:rPr lang="de-DE"/>
+              <a:t>Mastertextformat bearbeiten</a:t>
             </a:r>
           </a:p>
           <a:p>
             <a:pPr lvl="1"/>
             <a:r>
-              <a:rPr lang="en-US"/>
-              <a:t>Second level</a:t>
+              <a:rPr lang="de-DE"/>
+              <a:t>Zweite Ebene</a:t>
             </a:r>
           </a:p>
           <a:p>
             <a:pPr lvl="2"/>
             <a:r>
-              <a:rPr lang="en-US"/>
-              <a:t>Third level</a:t>
+              <a:rPr lang="de-DE"/>
+              <a:t>Dritte Ebene</a:t>
             </a:r>
           </a:p>
           <a:p>
             <a:pPr lvl="3"/>
             <a:r>
-              <a:rPr lang="en-US"/>
-              <a:t>Fourth level</a:t>
+              <a:rPr lang="de-DE"/>
+              <a:t>Vierte Ebene</a:t>
             </a:r>
           </a:p>
           <a:p>
             <a:pPr lvl="4"/>
             <a:r>
-              <a:rPr lang="en-US"/>
-              <a:t>Fifth level</a:t>
+              <a:rPr lang="de-DE"/>
+              <a:t>Fünfte Ebene</a:t>
             </a:r>
             <a:endParaRPr lang="en-US" dirty="0"/>
           </a:p>
@@ -2028,8 +2026,8 @@
         </p:nvSpPr>
         <p:spPr>
           <a:xfrm>
-            <a:off x="629841" y="1727835"/>
-            <a:ext cx="2949178" cy="3201028"/>
+            <a:off x="570356" y="1727835"/>
+            <a:ext cx="2670645" cy="3201028"/>
           </a:xfrm>
         </p:spPr>
         <p:txBody>
@@ -2037,46 +2035,46 @@
           <a:lstStyle>
             <a:lvl1pPr marL="0" indent="0">
               <a:buNone/>
-              <a:defRPr sz="1200"/>
+              <a:defRPr sz="1344"/>
             </a:lvl1pPr>
-            <a:lvl2pPr marL="342900" indent="0">
-              <a:buNone/>
-              <a:defRPr sz="1050"/>
+            <a:lvl2pPr marL="383957" indent="0">
+              <a:buNone/>
+              <a:defRPr sz="1176"/>
             </a:lvl2pPr>
-            <a:lvl3pPr marL="685800" indent="0">
-              <a:buNone/>
-              <a:defRPr sz="900"/>
+            <a:lvl3pPr marL="767913" indent="0">
+              <a:buNone/>
+              <a:defRPr sz="1008"/>
             </a:lvl3pPr>
-            <a:lvl4pPr marL="1028700" indent="0">
-              <a:buNone/>
-              <a:defRPr sz="750"/>
+            <a:lvl4pPr marL="1151870" indent="0">
+              <a:buNone/>
+              <a:defRPr sz="840"/>
             </a:lvl4pPr>
-            <a:lvl5pPr marL="1371600" indent="0">
-              <a:buNone/>
-              <a:defRPr sz="750"/>
+            <a:lvl5pPr marL="1535826" indent="0">
+              <a:buNone/>
+              <a:defRPr sz="840"/>
             </a:lvl5pPr>
-            <a:lvl6pPr marL="1714500" indent="0">
-              <a:buNone/>
-              <a:defRPr sz="750"/>
+            <a:lvl6pPr marL="1919783" indent="0">
+              <a:buNone/>
+              <a:defRPr sz="840"/>
             </a:lvl6pPr>
-            <a:lvl7pPr marL="2057400" indent="0">
-              <a:buNone/>
-              <a:defRPr sz="750"/>
+            <a:lvl7pPr marL="2303739" indent="0">
+              <a:buNone/>
+              <a:defRPr sz="840"/>
             </a:lvl7pPr>
-            <a:lvl8pPr marL="2400300" indent="0">
-              <a:buNone/>
-              <a:defRPr sz="750"/>
+            <a:lvl8pPr marL="2687696" indent="0">
+              <a:buNone/>
+              <a:defRPr sz="840"/>
             </a:lvl8pPr>
-            <a:lvl9pPr marL="2743200" indent="0">
-              <a:buNone/>
-              <a:defRPr sz="750"/>
+            <a:lvl9pPr marL="3071652" indent="0">
+              <a:buNone/>
+              <a:defRPr sz="840"/>
             </a:lvl9pPr>
           </a:lstStyle>
           <a:p>
             <a:pPr lvl="0"/>
             <a:r>
-              <a:rPr lang="en-US"/>
-              <a:t>Click to edit Master text styles</a:t>
+              <a:rPr lang="de-DE"/>
+              <a:t>Mastertextformat bearbeiten</a:t>
             </a:r>
           </a:p>
         </p:txBody>
@@ -2098,7 +2096,7 @@
           <a:p>
             <a:fld id="{2B41A6A7-50F4-463B-910E-CFAB06BEAEBD}" type="datetimeFigureOut">
               <a:rPr lang="de-DE" smtClean="0"/>
-              <a:t>20.10.2021</a:t>
+              <a:t>13.11.2022</a:t>
             </a:fld>
             <a:endParaRPr lang="de-DE"/>
           </a:p>
@@ -2140,7 +2138,7 @@
           <a:p>
             <a:fld id="{21F71EA9-8F64-41D2-B146-948977218CCE}" type="slidenum">
               <a:rPr lang="de-DE" smtClean="0"/>
-              <a:t>‹#›</a:t>
+              <a:t>‹Nr.›</a:t>
             </a:fld>
             <a:endParaRPr lang="de-DE"/>
           </a:p>
@@ -2149,7 +2147,7 @@
     </p:spTree>
     <p:extLst>
       <p:ext uri="{BB962C8B-B14F-4D97-AF65-F5344CB8AC3E}">
-        <p14:creationId xmlns:p14="http://schemas.microsoft.com/office/powerpoint/2010/main" val="2719532606"/>
+        <p14:creationId xmlns:p14="http://schemas.microsoft.com/office/powerpoint/2010/main" val="1323525886"/>
       </p:ext>
     </p:extLst>
   </p:cSld>
@@ -2161,7 +2159,7 @@
 
 <file path=ppt/slideLayouts/slideLayout9.xml><?xml version="1.0" encoding="utf-8"?>
 <p:sldLayout xmlns:a="http://schemas.openxmlformats.org/drawingml/2006/main" xmlns:r="http://schemas.openxmlformats.org/officeDocument/2006/relationships" xmlns:p="http://schemas.openxmlformats.org/presentationml/2006/main" type="picTx" preserve="1">
-  <p:cSld name="Picture with Caption">
+  <p:cSld name="Bild mit Überschrift">
     <p:spTree>
       <p:nvGrpSpPr>
         <p:cNvPr id="1" name=""/>
@@ -2188,21 +2186,21 @@
         </p:nvSpPr>
         <p:spPr>
           <a:xfrm>
-            <a:off x="629841" y="383963"/>
-            <a:ext cx="2949178" cy="1343872"/>
+            <a:off x="570356" y="383963"/>
+            <a:ext cx="2670645" cy="1343872"/>
           </a:xfrm>
         </p:spPr>
         <p:txBody>
           <a:bodyPr anchor="b"/>
           <a:lstStyle>
             <a:lvl1pPr>
-              <a:defRPr sz="2400"/>
+              <a:defRPr sz="2687"/>
             </a:lvl1pPr>
           </a:lstStyle>
           <a:p>
             <a:r>
-              <a:rPr lang="en-US"/>
-              <a:t>Click to edit Master title style</a:t>
+              <a:rPr lang="de-DE"/>
+              <a:t>Mastertitelformat bearbeiten</a:t>
             </a:r>
             <a:endParaRPr lang="en-US" dirty="0"/>
           </a:p>
@@ -2220,8 +2218,8 @@
         </p:nvSpPr>
         <p:spPr>
           <a:xfrm>
-            <a:off x="3887391" y="829255"/>
-            <a:ext cx="4629150" cy="4092942"/>
+            <a:off x="3520248" y="829256"/>
+            <a:ext cx="4191953" cy="4092942"/>
           </a:xfrm>
         </p:spPr>
         <p:txBody>
@@ -2229,45 +2227,45 @@
           <a:lstStyle>
             <a:lvl1pPr marL="0" indent="0">
               <a:buNone/>
-              <a:defRPr sz="2400"/>
+              <a:defRPr sz="2687"/>
             </a:lvl1pPr>
-            <a:lvl2pPr marL="342900" indent="0">
-              <a:buNone/>
-              <a:defRPr sz="2100"/>
+            <a:lvl2pPr marL="383957" indent="0">
+              <a:buNone/>
+              <a:defRPr sz="2351"/>
             </a:lvl2pPr>
-            <a:lvl3pPr marL="685800" indent="0">
-              <a:buNone/>
-              <a:defRPr sz="1800"/>
+            <a:lvl3pPr marL="767913" indent="0">
+              <a:buNone/>
+              <a:defRPr sz="2016"/>
             </a:lvl3pPr>
-            <a:lvl4pPr marL="1028700" indent="0">
-              <a:buNone/>
-              <a:defRPr sz="1500"/>
+            <a:lvl4pPr marL="1151870" indent="0">
+              <a:buNone/>
+              <a:defRPr sz="1680"/>
             </a:lvl4pPr>
-            <a:lvl5pPr marL="1371600" indent="0">
-              <a:buNone/>
-              <a:defRPr sz="1500"/>
+            <a:lvl5pPr marL="1535826" indent="0">
+              <a:buNone/>
+              <a:defRPr sz="1680"/>
             </a:lvl5pPr>
-            <a:lvl6pPr marL="1714500" indent="0">
-              <a:buNone/>
-              <a:defRPr sz="1500"/>
+            <a:lvl6pPr marL="1919783" indent="0">
+              <a:buNone/>
+              <a:defRPr sz="1680"/>
             </a:lvl6pPr>
-            <a:lvl7pPr marL="2057400" indent="0">
-              <a:buNone/>
-              <a:defRPr sz="1500"/>
+            <a:lvl7pPr marL="2303739" indent="0">
+              <a:buNone/>
+              <a:defRPr sz="1680"/>
             </a:lvl7pPr>
-            <a:lvl8pPr marL="2400300" indent="0">
-              <a:buNone/>
-              <a:defRPr sz="1500"/>
+            <a:lvl8pPr marL="2687696" indent="0">
+              <a:buNone/>
+              <a:defRPr sz="1680"/>
             </a:lvl8pPr>
-            <a:lvl9pPr marL="2743200" indent="0">
-              <a:buNone/>
-              <a:defRPr sz="1500"/>
+            <a:lvl9pPr marL="3071652" indent="0">
+              <a:buNone/>
+              <a:defRPr sz="1680"/>
             </a:lvl9pPr>
           </a:lstStyle>
           <a:p>
             <a:r>
-              <a:rPr lang="en-US"/>
-              <a:t>Click icon to add picture</a:t>
+              <a:rPr lang="de-DE"/>
+              <a:t>Bild durch Klicken auf Symbol hinzufügen</a:t>
             </a:r>
             <a:endParaRPr lang="en-US" dirty="0"/>
           </a:p>
@@ -2285,8 +2283,8 @@
         </p:nvSpPr>
         <p:spPr>
           <a:xfrm>
-            <a:off x="629841" y="1727835"/>
-            <a:ext cx="2949178" cy="3201028"/>
+            <a:off x="570356" y="1727835"/>
+            <a:ext cx="2670645" cy="3201028"/>
           </a:xfrm>
         </p:spPr>
         <p:txBody>
@@ -2294,46 +2292,46 @@
           <a:lstStyle>
             <a:lvl1pPr marL="0" indent="0">
               <a:buNone/>
-              <a:defRPr sz="1200"/>
+              <a:defRPr sz="1344"/>
             </a:lvl1pPr>
-            <a:lvl2pPr marL="342900" indent="0">
-              <a:buNone/>
-              <a:defRPr sz="1050"/>
+            <a:lvl2pPr marL="383957" indent="0">
+              <a:buNone/>
+              <a:defRPr sz="1176"/>
             </a:lvl2pPr>
-            <a:lvl3pPr marL="685800" indent="0">
-              <a:buNone/>
-              <a:defRPr sz="900"/>
+            <a:lvl3pPr marL="767913" indent="0">
+              <a:buNone/>
+              <a:defRPr sz="1008"/>
             </a:lvl3pPr>
-            <a:lvl4pPr marL="1028700" indent="0">
-              <a:buNone/>
-              <a:defRPr sz="750"/>
+            <a:lvl4pPr marL="1151870" indent="0">
+              <a:buNone/>
+              <a:defRPr sz="840"/>
             </a:lvl4pPr>
-            <a:lvl5pPr marL="1371600" indent="0">
-              <a:buNone/>
-              <a:defRPr sz="750"/>
+            <a:lvl5pPr marL="1535826" indent="0">
+              <a:buNone/>
+              <a:defRPr sz="840"/>
             </a:lvl5pPr>
-            <a:lvl6pPr marL="1714500" indent="0">
-              <a:buNone/>
-              <a:defRPr sz="750"/>
+            <a:lvl6pPr marL="1919783" indent="0">
+              <a:buNone/>
+              <a:defRPr sz="840"/>
             </a:lvl6pPr>
-            <a:lvl7pPr marL="2057400" indent="0">
-              <a:buNone/>
-              <a:defRPr sz="750"/>
+            <a:lvl7pPr marL="2303739" indent="0">
+              <a:buNone/>
+              <a:defRPr sz="840"/>
             </a:lvl7pPr>
-            <a:lvl8pPr marL="2400300" indent="0">
-              <a:buNone/>
-              <a:defRPr sz="750"/>
+            <a:lvl8pPr marL="2687696" indent="0">
+              <a:buNone/>
+              <a:defRPr sz="840"/>
             </a:lvl8pPr>
-            <a:lvl9pPr marL="2743200" indent="0">
-              <a:buNone/>
-              <a:defRPr sz="750"/>
+            <a:lvl9pPr marL="3071652" indent="0">
+              <a:buNone/>
+              <a:defRPr sz="840"/>
             </a:lvl9pPr>
           </a:lstStyle>
           <a:p>
             <a:pPr lvl="0"/>
             <a:r>
-              <a:rPr lang="en-US"/>
-              <a:t>Click to edit Master text styles</a:t>
+              <a:rPr lang="de-DE"/>
+              <a:t>Mastertextformat bearbeiten</a:t>
             </a:r>
           </a:p>
         </p:txBody>
@@ -2355,7 +2353,7 @@
           <a:p>
             <a:fld id="{2B41A6A7-50F4-463B-910E-CFAB06BEAEBD}" type="datetimeFigureOut">
               <a:rPr lang="de-DE" smtClean="0"/>
-              <a:t>20.10.2021</a:t>
+              <a:t>13.11.2022</a:t>
             </a:fld>
             <a:endParaRPr lang="de-DE"/>
           </a:p>
@@ -2397,7 +2395,7 @@
           <a:p>
             <a:fld id="{21F71EA9-8F64-41D2-B146-948977218CCE}" type="slidenum">
               <a:rPr lang="de-DE" smtClean="0"/>
-              <a:t>‹#›</a:t>
+              <a:t>‹Nr.›</a:t>
             </a:fld>
             <a:endParaRPr lang="de-DE"/>
           </a:p>
@@ -2406,7 +2404,7 @@
     </p:spTree>
     <p:extLst>
       <p:ext uri="{BB962C8B-B14F-4D97-AF65-F5344CB8AC3E}">
-        <p14:creationId xmlns:p14="http://schemas.microsoft.com/office/powerpoint/2010/main" val="1333455524"/>
+        <p14:creationId xmlns:p14="http://schemas.microsoft.com/office/powerpoint/2010/main" val="1423409829"/>
       </p:ext>
     </p:extLst>
   </p:cSld>
@@ -2450,8 +2448,8 @@
         </p:nvSpPr>
         <p:spPr>
           <a:xfrm>
-            <a:off x="628650" y="306638"/>
-            <a:ext cx="7886700" cy="1113227"/>
+            <a:off x="569278" y="306639"/>
+            <a:ext cx="7141845" cy="1113227"/>
           </a:xfrm>
           <a:prstGeom prst="rect">
             <a:avLst/>
@@ -2464,8 +2462,8 @@
           <a:lstStyle/>
           <a:p>
             <a:r>
-              <a:rPr lang="en-US"/>
-              <a:t>Click to edit Master title style</a:t>
+              <a:rPr lang="de-DE"/>
+              <a:t>Mastertitelformat bearbeiten</a:t>
             </a:r>
             <a:endParaRPr lang="en-US" dirty="0"/>
           </a:p>
@@ -2483,8 +2481,8 @@
         </p:nvSpPr>
         <p:spPr>
           <a:xfrm>
-            <a:off x="628650" y="1533187"/>
-            <a:ext cx="7886700" cy="3654318"/>
+            <a:off x="569278" y="1533187"/>
+            <a:ext cx="7141845" cy="3654318"/>
           </a:xfrm>
           <a:prstGeom prst="rect">
             <a:avLst/>
@@ -2498,36 +2496,36 @@
           <a:p>
             <a:pPr lvl="0"/>
             <a:r>
-              <a:rPr lang="en-US"/>
-              <a:t>Click to edit Master text styles</a:t>
+              <a:rPr lang="de-DE"/>
+              <a:t>Mastertextformat bearbeiten</a:t>
             </a:r>
           </a:p>
           <a:p>
             <a:pPr lvl="1"/>
             <a:r>
-              <a:rPr lang="en-US"/>
-              <a:t>Second level</a:t>
+              <a:rPr lang="de-DE"/>
+              <a:t>Zweite Ebene</a:t>
             </a:r>
           </a:p>
           <a:p>
             <a:pPr lvl="2"/>
             <a:r>
-              <a:rPr lang="en-US"/>
-              <a:t>Third level</a:t>
+              <a:rPr lang="de-DE"/>
+              <a:t>Dritte Ebene</a:t>
             </a:r>
           </a:p>
           <a:p>
             <a:pPr lvl="3"/>
             <a:r>
-              <a:rPr lang="en-US"/>
-              <a:t>Fourth level</a:t>
+              <a:rPr lang="de-DE"/>
+              <a:t>Vierte Ebene</a:t>
             </a:r>
           </a:p>
           <a:p>
             <a:pPr lvl="4"/>
             <a:r>
-              <a:rPr lang="en-US"/>
-              <a:t>Fifth level</a:t>
+              <a:rPr lang="de-DE"/>
+              <a:t>Fünfte Ebene</a:t>
             </a:r>
             <a:endParaRPr lang="en-US" dirty="0"/>
           </a:p>
@@ -2545,8 +2543,8 @@
         </p:nvSpPr>
         <p:spPr>
           <a:xfrm>
-            <a:off x="628650" y="5338158"/>
-            <a:ext cx="2057400" cy="306637"/>
+            <a:off x="569278" y="5338158"/>
+            <a:ext cx="1863090" cy="306637"/>
           </a:xfrm>
           <a:prstGeom prst="rect">
             <a:avLst/>
@@ -2556,7 +2554,7 @@
           <a:bodyPr vert="horz" lIns="91440" tIns="45720" rIns="91440" bIns="45720" rtlCol="0" anchor="ctr"/>
           <a:lstStyle>
             <a:lvl1pPr algn="l">
-              <a:defRPr sz="900">
+              <a:defRPr sz="1008">
                 <a:solidFill>
                   <a:schemeClr val="tx1">
                     <a:tint val="75000"/>
@@ -2568,7 +2566,7 @@
           <a:p>
             <a:fld id="{2B41A6A7-50F4-463B-910E-CFAB06BEAEBD}" type="datetimeFigureOut">
               <a:rPr lang="de-DE" smtClean="0"/>
-              <a:t>20.10.2021</a:t>
+              <a:t>13.11.2022</a:t>
             </a:fld>
             <a:endParaRPr lang="de-DE"/>
           </a:p>
@@ -2586,8 +2584,8 @@
         </p:nvSpPr>
         <p:spPr>
           <a:xfrm>
-            <a:off x="3028950" y="5338158"/>
-            <a:ext cx="3086100" cy="306637"/>
+            <a:off x="2742883" y="5338158"/>
+            <a:ext cx="2794635" cy="306637"/>
           </a:xfrm>
           <a:prstGeom prst="rect">
             <a:avLst/>
@@ -2597,7 +2595,7 @@
           <a:bodyPr vert="horz" lIns="91440" tIns="45720" rIns="91440" bIns="45720" rtlCol="0" anchor="ctr"/>
           <a:lstStyle>
             <a:lvl1pPr algn="ctr">
-              <a:defRPr sz="900">
+              <a:defRPr sz="1008">
                 <a:solidFill>
                   <a:schemeClr val="tx1">
                     <a:tint val="75000"/>
@@ -2623,8 +2621,8 @@
         </p:nvSpPr>
         <p:spPr>
           <a:xfrm>
-            <a:off x="6457950" y="5338158"/>
-            <a:ext cx="2057400" cy="306637"/>
+            <a:off x="5848033" y="5338158"/>
+            <a:ext cx="1863090" cy="306637"/>
           </a:xfrm>
           <a:prstGeom prst="rect">
             <a:avLst/>
@@ -2634,7 +2632,7 @@
           <a:bodyPr vert="horz" lIns="91440" tIns="45720" rIns="91440" bIns="45720" rtlCol="0" anchor="ctr"/>
           <a:lstStyle>
             <a:lvl1pPr algn="r">
-              <a:defRPr sz="900">
+              <a:defRPr sz="1008">
                 <a:solidFill>
                   <a:schemeClr val="tx1">
                     <a:tint val="75000"/>
@@ -2646,7 +2644,7 @@
           <a:p>
             <a:fld id="{21F71EA9-8F64-41D2-B146-948977218CCE}" type="slidenum">
               <a:rPr lang="de-DE" smtClean="0"/>
-              <a:t>‹#›</a:t>
+              <a:t>‹Nr.›</a:t>
             </a:fld>
             <a:endParaRPr lang="de-DE"/>
           </a:p>
@@ -2655,27 +2653,27 @@
     </p:spTree>
     <p:extLst>
       <p:ext uri="{BB962C8B-B14F-4D97-AF65-F5344CB8AC3E}">
-        <p14:creationId xmlns:p14="http://schemas.microsoft.com/office/powerpoint/2010/main" val="2561195470"/>
+        <p14:creationId xmlns:p14="http://schemas.microsoft.com/office/powerpoint/2010/main" val="665001336"/>
       </p:ext>
     </p:extLst>
   </p:cSld>
   <p:clrMap bg1="lt1" tx1="dk1" bg2="lt2" tx2="dk2" accent1="accent1" accent2="accent2" accent3="accent3" accent4="accent4" accent5="accent5" accent6="accent6" hlink="hlink" folHlink="folHlink"/>
   <p:sldLayoutIdLst>
-    <p:sldLayoutId id="2147483673" r:id="rId1"/>
-    <p:sldLayoutId id="2147483674" r:id="rId2"/>
-    <p:sldLayoutId id="2147483675" r:id="rId3"/>
-    <p:sldLayoutId id="2147483676" r:id="rId4"/>
-    <p:sldLayoutId id="2147483677" r:id="rId5"/>
-    <p:sldLayoutId id="2147483678" r:id="rId6"/>
-    <p:sldLayoutId id="2147483679" r:id="rId7"/>
-    <p:sldLayoutId id="2147483680" r:id="rId8"/>
-    <p:sldLayoutId id="2147483681" r:id="rId9"/>
-    <p:sldLayoutId id="2147483682" r:id="rId10"/>
-    <p:sldLayoutId id="2147483683" r:id="rId11"/>
+    <p:sldLayoutId id="2147483697" r:id="rId1"/>
+    <p:sldLayoutId id="2147483698" r:id="rId2"/>
+    <p:sldLayoutId id="2147483699" r:id="rId3"/>
+    <p:sldLayoutId id="2147483700" r:id="rId4"/>
+    <p:sldLayoutId id="2147483701" r:id="rId5"/>
+    <p:sldLayoutId id="2147483702" r:id="rId6"/>
+    <p:sldLayoutId id="2147483703" r:id="rId7"/>
+    <p:sldLayoutId id="2147483704" r:id="rId8"/>
+    <p:sldLayoutId id="2147483705" r:id="rId9"/>
+    <p:sldLayoutId id="2147483706" r:id="rId10"/>
+    <p:sldLayoutId id="2147483707" r:id="rId11"/>
   </p:sldLayoutIdLst>
   <p:txStyles>
     <p:titleStyle>
-      <a:lvl1pPr algn="l" defTabSz="685800" rtl="0" eaLnBrk="1" latinLnBrk="0" hangingPunct="1">
+      <a:lvl1pPr algn="l" defTabSz="767913" rtl="0" eaLnBrk="1" latinLnBrk="0" hangingPunct="1">
         <a:lnSpc>
           <a:spcPct val="90000"/>
         </a:lnSpc>
@@ -2683,7 +2681,7 @@
           <a:spcPct val="0"/>
         </a:spcBef>
         <a:buNone/>
-        <a:defRPr sz="3300" kern="1200">
+        <a:defRPr sz="3695" kern="1200">
           <a:solidFill>
             <a:schemeClr val="tx1"/>
           </a:solidFill>
@@ -2694,16 +2692,16 @@
       </a:lvl1pPr>
     </p:titleStyle>
     <p:bodyStyle>
-      <a:lvl1pPr marL="171450" indent="-171450" algn="l" defTabSz="685800" rtl="0" eaLnBrk="1" latinLnBrk="0" hangingPunct="1">
+      <a:lvl1pPr marL="191978" indent="-191978" algn="l" defTabSz="767913" rtl="0" eaLnBrk="1" latinLnBrk="0" hangingPunct="1">
         <a:lnSpc>
           <a:spcPct val="90000"/>
         </a:lnSpc>
         <a:spcBef>
-          <a:spcPts val="750"/>
+          <a:spcPts val="840"/>
         </a:spcBef>
         <a:buFont typeface="Arial" panose="020B0604020202020204" pitchFamily="34" charset="0"/>
         <a:buChar char="•"/>
-        <a:defRPr sz="2100" kern="1200">
+        <a:defRPr sz="2351" kern="1200">
           <a:solidFill>
             <a:schemeClr val="tx1"/>
           </a:solidFill>
@@ -2712,16 +2710,16 @@
           <a:cs typeface="+mn-cs"/>
         </a:defRPr>
       </a:lvl1pPr>
-      <a:lvl2pPr marL="514350" indent="-171450" algn="l" defTabSz="685800" rtl="0" eaLnBrk="1" latinLnBrk="0" hangingPunct="1">
+      <a:lvl2pPr marL="575935" indent="-191978" algn="l" defTabSz="767913" rtl="0" eaLnBrk="1" latinLnBrk="0" hangingPunct="1">
         <a:lnSpc>
           <a:spcPct val="90000"/>
         </a:lnSpc>
         <a:spcBef>
-          <a:spcPts val="375"/>
+          <a:spcPts val="420"/>
         </a:spcBef>
         <a:buFont typeface="Arial" panose="020B0604020202020204" pitchFamily="34" charset="0"/>
         <a:buChar char="•"/>
-        <a:defRPr sz="1800" kern="1200">
+        <a:defRPr sz="2016" kern="1200">
           <a:solidFill>
             <a:schemeClr val="tx1"/>
           </a:solidFill>
@@ -2730,16 +2728,16 @@
           <a:cs typeface="+mn-cs"/>
         </a:defRPr>
       </a:lvl2pPr>
-      <a:lvl3pPr marL="857250" indent="-171450" algn="l" defTabSz="685800" rtl="0" eaLnBrk="1" latinLnBrk="0" hangingPunct="1">
+      <a:lvl3pPr marL="959891" indent="-191978" algn="l" defTabSz="767913" rtl="0" eaLnBrk="1" latinLnBrk="0" hangingPunct="1">
         <a:lnSpc>
           <a:spcPct val="90000"/>
         </a:lnSpc>
         <a:spcBef>
-          <a:spcPts val="375"/>
+          <a:spcPts val="420"/>
         </a:spcBef>
         <a:buFont typeface="Arial" panose="020B0604020202020204" pitchFamily="34" charset="0"/>
         <a:buChar char="•"/>
-        <a:defRPr sz="1500" kern="1200">
+        <a:defRPr sz="1680" kern="1200">
           <a:solidFill>
             <a:schemeClr val="tx1"/>
           </a:solidFill>
@@ -2748,16 +2746,16 @@
           <a:cs typeface="+mn-cs"/>
         </a:defRPr>
       </a:lvl3pPr>
-      <a:lvl4pPr marL="1200150" indent="-171450" algn="l" defTabSz="685800" rtl="0" eaLnBrk="1" latinLnBrk="0" hangingPunct="1">
+      <a:lvl4pPr marL="1343848" indent="-191978" algn="l" defTabSz="767913" rtl="0" eaLnBrk="1" latinLnBrk="0" hangingPunct="1">
         <a:lnSpc>
           <a:spcPct val="90000"/>
         </a:lnSpc>
         <a:spcBef>
-          <a:spcPts val="375"/>
+          <a:spcPts val="420"/>
         </a:spcBef>
         <a:buFont typeface="Arial" panose="020B0604020202020204" pitchFamily="34" charset="0"/>
         <a:buChar char="•"/>
-        <a:defRPr sz="1350" kern="1200">
+        <a:defRPr sz="1512" kern="1200">
           <a:solidFill>
             <a:schemeClr val="tx1"/>
           </a:solidFill>
@@ -2766,16 +2764,16 @@
           <a:cs typeface="+mn-cs"/>
         </a:defRPr>
       </a:lvl4pPr>
-      <a:lvl5pPr marL="1543050" indent="-171450" algn="l" defTabSz="685800" rtl="0" eaLnBrk="1" latinLnBrk="0" hangingPunct="1">
+      <a:lvl5pPr marL="1727805" indent="-191978" algn="l" defTabSz="767913" rtl="0" eaLnBrk="1" latinLnBrk="0" hangingPunct="1">
         <a:lnSpc>
           <a:spcPct val="90000"/>
         </a:lnSpc>
         <a:spcBef>
-          <a:spcPts val="375"/>
+          <a:spcPts val="420"/>
         </a:spcBef>
         <a:buFont typeface="Arial" panose="020B0604020202020204" pitchFamily="34" charset="0"/>
         <a:buChar char="•"/>
-        <a:defRPr sz="1350" kern="1200">
+        <a:defRPr sz="1512" kern="1200">
           <a:solidFill>
             <a:schemeClr val="tx1"/>
           </a:solidFill>
@@ -2784,16 +2782,16 @@
           <a:cs typeface="+mn-cs"/>
         </a:defRPr>
       </a:lvl5pPr>
-      <a:lvl6pPr marL="1885950" indent="-171450" algn="l" defTabSz="685800" rtl="0" eaLnBrk="1" latinLnBrk="0" hangingPunct="1">
+      <a:lvl6pPr marL="2111761" indent="-191978" algn="l" defTabSz="767913" rtl="0" eaLnBrk="1" latinLnBrk="0" hangingPunct="1">
         <a:lnSpc>
           <a:spcPct val="90000"/>
         </a:lnSpc>
         <a:spcBef>
-          <a:spcPts val="375"/>
+          <a:spcPts val="420"/>
         </a:spcBef>
         <a:buFont typeface="Arial" panose="020B0604020202020204" pitchFamily="34" charset="0"/>
         <a:buChar char="•"/>
-        <a:defRPr sz="1350" kern="1200">
+        <a:defRPr sz="1512" kern="1200">
           <a:solidFill>
             <a:schemeClr val="tx1"/>
           </a:solidFill>
@@ -2802,16 +2800,16 @@
           <a:cs typeface="+mn-cs"/>
         </a:defRPr>
       </a:lvl6pPr>
-      <a:lvl7pPr marL="2228850" indent="-171450" algn="l" defTabSz="685800" rtl="0" eaLnBrk="1" latinLnBrk="0" hangingPunct="1">
+      <a:lvl7pPr marL="2495718" indent="-191978" algn="l" defTabSz="767913" rtl="0" eaLnBrk="1" latinLnBrk="0" hangingPunct="1">
         <a:lnSpc>
           <a:spcPct val="90000"/>
         </a:lnSpc>
         <a:spcBef>
-          <a:spcPts val="375"/>
+          <a:spcPts val="420"/>
         </a:spcBef>
         <a:buFont typeface="Arial" panose="020B0604020202020204" pitchFamily="34" charset="0"/>
         <a:buChar char="•"/>
-        <a:defRPr sz="1350" kern="1200">
+        <a:defRPr sz="1512" kern="1200">
           <a:solidFill>
             <a:schemeClr val="tx1"/>
           </a:solidFill>
@@ -2820,16 +2818,16 @@
           <a:cs typeface="+mn-cs"/>
         </a:defRPr>
       </a:lvl7pPr>
-      <a:lvl8pPr marL="2571750" indent="-171450" algn="l" defTabSz="685800" rtl="0" eaLnBrk="1" latinLnBrk="0" hangingPunct="1">
+      <a:lvl8pPr marL="2879674" indent="-191978" algn="l" defTabSz="767913" rtl="0" eaLnBrk="1" latinLnBrk="0" hangingPunct="1">
         <a:lnSpc>
           <a:spcPct val="90000"/>
         </a:lnSpc>
         <a:spcBef>
-          <a:spcPts val="375"/>
+          <a:spcPts val="420"/>
         </a:spcBef>
         <a:buFont typeface="Arial" panose="020B0604020202020204" pitchFamily="34" charset="0"/>
         <a:buChar char="•"/>
-        <a:defRPr sz="1350" kern="1200">
+        <a:defRPr sz="1512" kern="1200">
           <a:solidFill>
             <a:schemeClr val="tx1"/>
           </a:solidFill>
@@ -2838,16 +2836,16 @@
           <a:cs typeface="+mn-cs"/>
         </a:defRPr>
       </a:lvl8pPr>
-      <a:lvl9pPr marL="2914650" indent="-171450" algn="l" defTabSz="685800" rtl="0" eaLnBrk="1" latinLnBrk="0" hangingPunct="1">
+      <a:lvl9pPr marL="3263631" indent="-191978" algn="l" defTabSz="767913" rtl="0" eaLnBrk="1" latinLnBrk="0" hangingPunct="1">
         <a:lnSpc>
           <a:spcPct val="90000"/>
         </a:lnSpc>
         <a:spcBef>
-          <a:spcPts val="375"/>
+          <a:spcPts val="420"/>
         </a:spcBef>
         <a:buFont typeface="Arial" panose="020B0604020202020204" pitchFamily="34" charset="0"/>
         <a:buChar char="•"/>
-        <a:defRPr sz="1350" kern="1200">
+        <a:defRPr sz="1512" kern="1200">
           <a:solidFill>
             <a:schemeClr val="tx1"/>
           </a:solidFill>
@@ -2861,8 +2859,8 @@
       <a:defPPr>
         <a:defRPr lang="en-US"/>
       </a:defPPr>
-      <a:lvl1pPr marL="0" algn="l" defTabSz="685800" rtl="0" eaLnBrk="1" latinLnBrk="0" hangingPunct="1">
-        <a:defRPr sz="1350" kern="1200">
+      <a:lvl1pPr marL="0" algn="l" defTabSz="767913" rtl="0" eaLnBrk="1" latinLnBrk="0" hangingPunct="1">
+        <a:defRPr sz="1512" kern="1200">
           <a:solidFill>
             <a:schemeClr val="tx1"/>
           </a:solidFill>
@@ -2871,8 +2869,8 @@
           <a:cs typeface="+mn-cs"/>
         </a:defRPr>
       </a:lvl1pPr>
-      <a:lvl2pPr marL="342900" algn="l" defTabSz="685800" rtl="0" eaLnBrk="1" latinLnBrk="0" hangingPunct="1">
-        <a:defRPr sz="1350" kern="1200">
+      <a:lvl2pPr marL="383957" algn="l" defTabSz="767913" rtl="0" eaLnBrk="1" latinLnBrk="0" hangingPunct="1">
+        <a:defRPr sz="1512" kern="1200">
           <a:solidFill>
             <a:schemeClr val="tx1"/>
           </a:solidFill>
@@ -2881,8 +2879,8 @@
           <a:cs typeface="+mn-cs"/>
         </a:defRPr>
       </a:lvl2pPr>
-      <a:lvl3pPr marL="685800" algn="l" defTabSz="685800" rtl="0" eaLnBrk="1" latinLnBrk="0" hangingPunct="1">
-        <a:defRPr sz="1350" kern="1200">
+      <a:lvl3pPr marL="767913" algn="l" defTabSz="767913" rtl="0" eaLnBrk="1" latinLnBrk="0" hangingPunct="1">
+        <a:defRPr sz="1512" kern="1200">
           <a:solidFill>
             <a:schemeClr val="tx1"/>
           </a:solidFill>
@@ -2891,8 +2889,8 @@
           <a:cs typeface="+mn-cs"/>
         </a:defRPr>
       </a:lvl3pPr>
-      <a:lvl4pPr marL="1028700" algn="l" defTabSz="685800" rtl="0" eaLnBrk="1" latinLnBrk="0" hangingPunct="1">
-        <a:defRPr sz="1350" kern="1200">
+      <a:lvl4pPr marL="1151870" algn="l" defTabSz="767913" rtl="0" eaLnBrk="1" latinLnBrk="0" hangingPunct="1">
+        <a:defRPr sz="1512" kern="1200">
           <a:solidFill>
             <a:schemeClr val="tx1"/>
           </a:solidFill>
@@ -2901,8 +2899,8 @@
           <a:cs typeface="+mn-cs"/>
         </a:defRPr>
       </a:lvl4pPr>
-      <a:lvl5pPr marL="1371600" algn="l" defTabSz="685800" rtl="0" eaLnBrk="1" latinLnBrk="0" hangingPunct="1">
-        <a:defRPr sz="1350" kern="1200">
+      <a:lvl5pPr marL="1535826" algn="l" defTabSz="767913" rtl="0" eaLnBrk="1" latinLnBrk="0" hangingPunct="1">
+        <a:defRPr sz="1512" kern="1200">
           <a:solidFill>
             <a:schemeClr val="tx1"/>
           </a:solidFill>
@@ -2911,8 +2909,8 @@
           <a:cs typeface="+mn-cs"/>
         </a:defRPr>
       </a:lvl5pPr>
-      <a:lvl6pPr marL="1714500" algn="l" defTabSz="685800" rtl="0" eaLnBrk="1" latinLnBrk="0" hangingPunct="1">
-        <a:defRPr sz="1350" kern="1200">
+      <a:lvl6pPr marL="1919783" algn="l" defTabSz="767913" rtl="0" eaLnBrk="1" latinLnBrk="0" hangingPunct="1">
+        <a:defRPr sz="1512" kern="1200">
           <a:solidFill>
             <a:schemeClr val="tx1"/>
           </a:solidFill>
@@ -2921,8 +2919,8 @@
           <a:cs typeface="+mn-cs"/>
         </a:defRPr>
       </a:lvl6pPr>
-      <a:lvl7pPr marL="2057400" algn="l" defTabSz="685800" rtl="0" eaLnBrk="1" latinLnBrk="0" hangingPunct="1">
-        <a:defRPr sz="1350" kern="1200">
+      <a:lvl7pPr marL="2303739" algn="l" defTabSz="767913" rtl="0" eaLnBrk="1" latinLnBrk="0" hangingPunct="1">
+        <a:defRPr sz="1512" kern="1200">
           <a:solidFill>
             <a:schemeClr val="tx1"/>
           </a:solidFill>
@@ -2931,8 +2929,8 @@
           <a:cs typeface="+mn-cs"/>
         </a:defRPr>
       </a:lvl7pPr>
-      <a:lvl8pPr marL="2400300" algn="l" defTabSz="685800" rtl="0" eaLnBrk="1" latinLnBrk="0" hangingPunct="1">
-        <a:defRPr sz="1350" kern="1200">
+      <a:lvl8pPr marL="2687696" algn="l" defTabSz="767913" rtl="0" eaLnBrk="1" latinLnBrk="0" hangingPunct="1">
+        <a:defRPr sz="1512" kern="1200">
           <a:solidFill>
             <a:schemeClr val="tx1"/>
           </a:solidFill>
@@ -2941,8 +2939,8 @@
           <a:cs typeface="+mn-cs"/>
         </a:defRPr>
       </a:lvl8pPr>
-      <a:lvl9pPr marL="2743200" algn="l" defTabSz="685800" rtl="0" eaLnBrk="1" latinLnBrk="0" hangingPunct="1">
-        <a:defRPr sz="1350" kern="1200">
+      <a:lvl9pPr marL="3071652" algn="l" defTabSz="767913" rtl="0" eaLnBrk="1" latinLnBrk="0" hangingPunct="1">
+        <a:defRPr sz="1512" kern="1200">
           <a:solidFill>
             <a:schemeClr val="tx1"/>
           </a:solidFill>
@@ -2987,7 +2985,7 @@
         </p:nvGrpSpPr>
         <p:grpSpPr>
           <a:xfrm>
-            <a:off x="637564" y="279879"/>
+            <a:off x="213081" y="235991"/>
             <a:ext cx="7809659" cy="5356301"/>
             <a:chOff x="637563" y="829153"/>
             <a:chExt cx="7809659" cy="5356301"/>
@@ -3460,8 +3458,8 @@
             </a:p>
           </p:txBody>
         </p:sp>
-        <mc:AlternateContent xmlns:mc="http://schemas.openxmlformats.org/markup-compatibility/2006" xmlns:a14="http://schemas.microsoft.com/office/drawing/2010/main">
-          <mc:Choice Requires="a14">
+        <mc:AlternateContent xmlns:mc="http://schemas.openxmlformats.org/markup-compatibility/2006">
+          <mc:Choice xmlns:a14="http://schemas.microsoft.com/office/drawing/2010/main" Requires="a14">
             <p:sp>
               <p:nvSpPr>
                 <p:cNvPr id="16" name="TextBox 15">
@@ -3477,7 +3475,7 @@
               <p:spPr>
                 <a:xfrm>
                   <a:off x="1398803" y="3407910"/>
-                  <a:ext cx="1905906" cy="338554"/>
+                  <a:ext cx="1875257" cy="338554"/>
                 </a:xfrm>
                 <a:prstGeom prst="rect">
                   <a:avLst/>
@@ -3575,7 +3573,7 @@
                             </a:solidFill>
                             <a:latin typeface="Cambria Math" panose="02040503050406030204" pitchFamily="18" charset="0"/>
                           </a:rPr>
-                          <m:t>𝑋</m:t>
+                          <m:t>𝜉</m:t>
                         </m:r>
                         <m:r>
                           <a:rPr lang="de-DE" sz="1600" i="1">
@@ -3628,7 +3626,7 @@
               </p:txBody>
             </p:sp>
           </mc:Choice>
-          <mc:Fallback xmlns="">
+          <mc:Fallback>
             <p:sp>
               <p:nvSpPr>
                 <p:cNvPr id="16" name="TextBox 15">
@@ -3646,7 +3644,7 @@
               <p:spPr>
                 <a:xfrm>
                   <a:off x="1398803" y="3407910"/>
-                  <a:ext cx="1905906" cy="338554"/>
+                  <a:ext cx="1875257" cy="338554"/>
                 </a:xfrm>
                 <a:prstGeom prst="rect">
                   <a:avLst/>
@@ -3654,7 +3652,7 @@
                 <a:blipFill>
                   <a:blip r:embed="rId3"/>
                   <a:stretch>
-                    <a:fillRect/>
+                    <a:fillRect b="-10909"/>
                   </a:stretch>
                 </a:blipFill>
               </p:spPr>
@@ -3673,8 +3671,8 @@
             </p:sp>
           </mc:Fallback>
         </mc:AlternateContent>
-        <mc:AlternateContent xmlns:mc="http://schemas.openxmlformats.org/markup-compatibility/2006" xmlns:a14="http://schemas.microsoft.com/office/drawing/2010/main">
-          <mc:Choice Requires="a14">
+        <mc:AlternateContent xmlns:mc="http://schemas.openxmlformats.org/markup-compatibility/2006">
+          <mc:Choice xmlns:a14="http://schemas.microsoft.com/office/drawing/2010/main" Requires="a14">
             <p:sp>
               <p:nvSpPr>
                 <p:cNvPr id="17" name="TextBox 16">
@@ -3690,7 +3688,7 @@
               <p:spPr>
                 <a:xfrm>
                   <a:off x="1362607" y="4157997"/>
-                  <a:ext cx="1978298" cy="338554"/>
+                  <a:ext cx="1930913" cy="364780"/>
                 </a:xfrm>
                 <a:prstGeom prst="rect">
                   <a:avLst/>
@@ -3740,7 +3738,7 @@
                                 </a:solidFill>
                                 <a:latin typeface="Cambria Math" panose="02040503050406030204" pitchFamily="18" charset="0"/>
                               </a:rPr>
-                              <m:t>𝑋</m:t>
+                              <m:t>𝜉</m:t>
                             </m:r>
                           </m:sub>
                         </m:sSub>
@@ -3813,7 +3811,7 @@
                                 </a:solidFill>
                                 <a:latin typeface="Cambria Math" panose="02040503050406030204" pitchFamily="18" charset="0"/>
                               </a:rPr>
-                              <m:t>𝑋</m:t>
+                              <m:t>𝜉</m:t>
                             </m:r>
                           </m:e>
                           <m:sup>
@@ -3867,7 +3865,7 @@
               </p:txBody>
             </p:sp>
           </mc:Choice>
-          <mc:Fallback xmlns="">
+          <mc:Fallback>
             <p:sp>
               <p:nvSpPr>
                 <p:cNvPr id="17" name="TextBox 16">
@@ -3885,7 +3883,7 @@
               <p:spPr>
                 <a:xfrm>
                   <a:off x="1362607" y="4157997"/>
-                  <a:ext cx="1978298" cy="338554"/>
+                  <a:ext cx="1930913" cy="364780"/>
                 </a:xfrm>
                 <a:prstGeom prst="rect">
                   <a:avLst/>
@@ -3893,7 +3891,7 @@
                 <a:blipFill>
                   <a:blip r:embed="rId4"/>
                   <a:stretch>
-                    <a:fillRect b="-8929"/>
+                    <a:fillRect b="-5000"/>
                   </a:stretch>
                 </a:blipFill>
               </p:spPr>
@@ -4565,7 +4563,7 @@
 <file path=ppt/theme/theme1.xml><?xml version="1.0" encoding="utf-8"?>
 <a:theme xmlns:a="http://schemas.openxmlformats.org/drawingml/2006/main" name="Office">
   <a:themeElements>
-    <a:clrScheme name="Office Theme">
+    <a:clrScheme name="Office">
       <a:dk1>
         <a:sysClr val="windowText" lastClr="000000"/>
       </a:dk1>
@@ -4603,7 +4601,7 @@
         <a:srgbClr val="954F72"/>
       </a:folHlink>
     </a:clrScheme>
-    <a:fontScheme name="Office Theme">
+    <a:fontScheme name="Office">
       <a:majorFont>
         <a:latin typeface="Calibri Light" panose="020F0302020204030204"/>
         <a:ea typeface=""/>
@@ -4675,7 +4673,7 @@
         <a:font script="Geor" typeface="Sylfaen"/>
       </a:minorFont>
     </a:fontScheme>
-    <a:fmtScheme name="Office Theme">
+    <a:fmtScheme name="Office">
       <a:fillStyleLst>
         <a:solidFill>
           <a:schemeClr val="phClr"/>

</xml_diff>